<commit_message>
Tweakin' it for the last time.
</commit_message>
<xml_diff>
--- a/docs/marklogic_and_the_linked-data_connection.pptx
+++ b/docs/marklogic_and_the_linked-data_connection.pptx
@@ -5,7 +5,7 @@
     <p:sldMasterId id="2147483662" r:id="rId1"/>
   </p:sldMasterIdLst>
   <p:notesMasterIdLst>
-    <p:notesMasterId r:id="rId29"/>
+    <p:notesMasterId r:id="rId28"/>
   </p:notesMasterIdLst>
   <p:sldIdLst>
     <p:sldId id="288" r:id="rId2"/>
@@ -14,27 +14,26 @@
     <p:sldId id="279" r:id="rId5"/>
     <p:sldId id="282" r:id="rId6"/>
     <p:sldId id="283" r:id="rId7"/>
-    <p:sldId id="284" r:id="rId8"/>
-    <p:sldId id="285" r:id="rId9"/>
-    <p:sldId id="286" r:id="rId10"/>
-    <p:sldId id="287" r:id="rId11"/>
-    <p:sldId id="289" r:id="rId12"/>
-    <p:sldId id="290" r:id="rId13"/>
-    <p:sldId id="291" r:id="rId14"/>
-    <p:sldId id="292" r:id="rId15"/>
-    <p:sldId id="293" r:id="rId16"/>
-    <p:sldId id="294" r:id="rId17"/>
-    <p:sldId id="295" r:id="rId18"/>
-    <p:sldId id="296" r:id="rId19"/>
-    <p:sldId id="297" r:id="rId20"/>
-    <p:sldId id="298" r:id="rId21"/>
-    <p:sldId id="299" r:id="rId22"/>
-    <p:sldId id="306" r:id="rId23"/>
-    <p:sldId id="307" r:id="rId24"/>
-    <p:sldId id="302" r:id="rId25"/>
-    <p:sldId id="303" r:id="rId26"/>
-    <p:sldId id="304" r:id="rId27"/>
-    <p:sldId id="275" r:id="rId28"/>
+    <p:sldId id="285" r:id="rId8"/>
+    <p:sldId id="286" r:id="rId9"/>
+    <p:sldId id="287" r:id="rId10"/>
+    <p:sldId id="289" r:id="rId11"/>
+    <p:sldId id="290" r:id="rId12"/>
+    <p:sldId id="291" r:id="rId13"/>
+    <p:sldId id="292" r:id="rId14"/>
+    <p:sldId id="293" r:id="rId15"/>
+    <p:sldId id="294" r:id="rId16"/>
+    <p:sldId id="295" r:id="rId17"/>
+    <p:sldId id="296" r:id="rId18"/>
+    <p:sldId id="297" r:id="rId19"/>
+    <p:sldId id="298" r:id="rId20"/>
+    <p:sldId id="299" r:id="rId21"/>
+    <p:sldId id="306" r:id="rId22"/>
+    <p:sldId id="307" r:id="rId23"/>
+    <p:sldId id="302" r:id="rId24"/>
+    <p:sldId id="303" r:id="rId25"/>
+    <p:sldId id="304" r:id="rId26"/>
+    <p:sldId id="275" r:id="rId27"/>
   </p:sldIdLst>
   <p:sldSz cx="9144000" cy="6858000" type="screen4x3"/>
   <p:notesSz cx="6934200" cy="9232900"/>
@@ -622,10 +621,10 @@
                 <a:ea typeface="+mn-ea"/>
                 <a:cs typeface="+mn-cs"/>
               </a:rPr>
-              <a:t>it has lead to a variety of implementation specific APIs to load and query the </a:t>
-            </a:r>
-            <a:br>
-              <a:rPr lang="en-US" sz="1200" kern="1200" dirty="0" smtClean="0">
+              <a:t>and the additional complexity of a middle-tier </a:t>
+            </a:r>
+            <a:r>
+              <a:rPr lang="en-US" sz="1200" kern="1200" dirty="0" err="1" smtClean="0">
                 <a:solidFill>
                   <a:schemeClr val="tx1"/>
                 </a:solidFill>
@@ -633,7 +632,8 @@
                 <a:ea typeface="+mn-ea"/>
                 <a:cs typeface="+mn-cs"/>
               </a:rPr>
-            </a:br>
+              <a:t>archtecture</a:t>
+            </a:r>
             <a:r>
               <a:rPr lang="en-US" sz="1200" kern="1200" dirty="0" smtClean="0">
                 <a:solidFill>
@@ -643,7 +643,28 @@
                 <a:ea typeface="+mn-ea"/>
                 <a:cs typeface="+mn-cs"/>
               </a:rPr>
-              <a:t>data sets held within </a:t>
+              <a:t> to bridge the gap </a:t>
+            </a:r>
+            <a:br>
+              <a:rPr lang="en-US" sz="1200" kern="1200" dirty="0" smtClean="0">
+                <a:solidFill>
+                  <a:schemeClr val="tx1"/>
+                </a:solidFill>
+                <a:latin typeface="+mn-lt"/>
+                <a:ea typeface="+mn-ea"/>
+                <a:cs typeface="+mn-cs"/>
+              </a:rPr>
+            </a:br>
+            <a:r>
+              <a:rPr lang="en-US" sz="1200" kern="1200" dirty="0" smtClean="0">
+                <a:solidFill>
+                  <a:schemeClr val="tx1"/>
+                </a:solidFill>
+                <a:latin typeface="+mn-lt"/>
+                <a:ea typeface="+mn-ea"/>
+                <a:cs typeface="+mn-cs"/>
+              </a:rPr>
+              <a:t>between content stores and graph stores.</a:t>
             </a:r>
             <a:endParaRPr lang="en-GB" dirty="0"/>
           </a:p>
@@ -736,10 +757,10 @@
                 <a:ea typeface="+mn-ea"/>
                 <a:cs typeface="+mn-cs"/>
               </a:rPr>
-              <a:t>and the additional complexity of a middle-tier </a:t>
-            </a:r>
-            <a:r>
-              <a:rPr lang="en-US" sz="1200" kern="1200" dirty="0" err="1" smtClean="0">
+              <a:t>The W3C have been working on a number of specifications regarding managing and </a:t>
+            </a:r>
+            <a:br>
+              <a:rPr lang="en-US" sz="1200" kern="1200" dirty="0" smtClean="0">
                 <a:solidFill>
                   <a:schemeClr val="tx1"/>
                 </a:solidFill>
@@ -747,8 +768,7 @@
                 <a:ea typeface="+mn-ea"/>
                 <a:cs typeface="+mn-cs"/>
               </a:rPr>
-              <a:t>archtecture</a:t>
-            </a:r>
+            </a:br>
             <a:r>
               <a:rPr lang="en-US" sz="1200" kern="1200" dirty="0" smtClean="0">
                 <a:solidFill>
@@ -758,28 +778,7 @@
                 <a:ea typeface="+mn-ea"/>
                 <a:cs typeface="+mn-cs"/>
               </a:rPr>
-              <a:t> to bridge the gap </a:t>
-            </a:r>
-            <a:br>
-              <a:rPr lang="en-US" sz="1200" kern="1200" dirty="0" smtClean="0">
-                <a:solidFill>
-                  <a:schemeClr val="tx1"/>
-                </a:solidFill>
-                <a:latin typeface="+mn-lt"/>
-                <a:ea typeface="+mn-ea"/>
-                <a:cs typeface="+mn-cs"/>
-              </a:rPr>
-            </a:br>
-            <a:r>
-              <a:rPr lang="en-US" sz="1200" kern="1200" dirty="0" smtClean="0">
-                <a:solidFill>
-                  <a:schemeClr val="tx1"/>
-                </a:solidFill>
-                <a:latin typeface="+mn-lt"/>
-                <a:ea typeface="+mn-ea"/>
-                <a:cs typeface="+mn-cs"/>
-              </a:rPr>
-              <a:t>between content stores and graph stores.</a:t>
+              <a:t>querying RDF data sets over HTTP</a:t>
             </a:r>
             <a:endParaRPr lang="en-GB" dirty="0"/>
           </a:p>
@@ -872,28 +871,7 @@
                 <a:ea typeface="+mn-ea"/>
                 <a:cs typeface="+mn-cs"/>
               </a:rPr>
-              <a:t>The W3C have been working on a number of specifications regarding managing and </a:t>
-            </a:r>
-            <a:br>
-              <a:rPr lang="en-US" sz="1200" kern="1200" dirty="0" smtClean="0">
-                <a:solidFill>
-                  <a:schemeClr val="tx1"/>
-                </a:solidFill>
-                <a:latin typeface="+mn-lt"/>
-                <a:ea typeface="+mn-ea"/>
-                <a:cs typeface="+mn-cs"/>
-              </a:rPr>
-            </a:br>
-            <a:r>
-              <a:rPr lang="en-US" sz="1200" kern="1200" dirty="0" smtClean="0">
-                <a:solidFill>
-                  <a:schemeClr val="tx1"/>
-                </a:solidFill>
-                <a:latin typeface="+mn-lt"/>
-                <a:ea typeface="+mn-ea"/>
-                <a:cs typeface="+mn-cs"/>
-              </a:rPr>
-              <a:t>querying RDF data sets over HTTP</a:t>
+              <a:t>Support is growing for these protocols </a:t>
             </a:r>
             <a:endParaRPr lang="en-GB" dirty="0"/>
           </a:p>
@@ -917,7 +895,7 @@
             <a:fld id="{708EA56A-F1B3-4F1F-ACD0-DEC49C4A85DD}" type="slidenum">
               <a:rPr lang="en-US" smtClean="0"/>
               <a:pPr/>
-              <a:t>12</a:t>
+              <a:t>14</a:t>
             </a:fld>
             <a:endParaRPr lang="en-US" dirty="0"/>
           </a:p>
@@ -986,7 +964,94 @@
                 <a:ea typeface="+mn-ea"/>
                 <a:cs typeface="+mn-cs"/>
               </a:rPr>
-              <a:t>Support is growing for these protocols </a:t>
+              <a:t>and to enable </a:t>
+            </a:r>
+            <a:r>
+              <a:rPr lang="en-US" sz="1200" kern="1200" dirty="0" err="1" smtClean="0">
+                <a:solidFill>
+                  <a:schemeClr val="tx1"/>
+                </a:solidFill>
+                <a:latin typeface="+mn-lt"/>
+                <a:ea typeface="+mn-ea"/>
+                <a:cs typeface="+mn-cs"/>
+              </a:rPr>
+              <a:t>MarkLogic</a:t>
+            </a:r>
+            <a:r>
+              <a:rPr lang="en-US" sz="1200" kern="1200" dirty="0" smtClean="0">
+                <a:solidFill>
+                  <a:schemeClr val="tx1"/>
+                </a:solidFill>
+                <a:latin typeface="+mn-lt"/>
+                <a:ea typeface="+mn-ea"/>
+                <a:cs typeface="+mn-cs"/>
+              </a:rPr>
+              <a:t> to interact directly with these data sources I've been </a:t>
+            </a:r>
+            <a:br>
+              <a:rPr lang="en-US" sz="1200" kern="1200" dirty="0" smtClean="0">
+                <a:solidFill>
+                  <a:schemeClr val="tx1"/>
+                </a:solidFill>
+                <a:latin typeface="+mn-lt"/>
+                <a:ea typeface="+mn-ea"/>
+                <a:cs typeface="+mn-cs"/>
+              </a:rPr>
+            </a:br>
+            <a:r>
+              <a:rPr lang="en-US" sz="1200" kern="1200" dirty="0" smtClean="0">
+                <a:solidFill>
+                  <a:schemeClr val="tx1"/>
+                </a:solidFill>
+                <a:latin typeface="+mn-lt"/>
+                <a:ea typeface="+mn-ea"/>
+                <a:cs typeface="+mn-cs"/>
+              </a:rPr>
+              <a:t>developing GRASP (</a:t>
+            </a:r>
+            <a:r>
+              <a:rPr lang="en-US" sz="1200" kern="1200" dirty="0" err="1" smtClean="0">
+                <a:solidFill>
+                  <a:schemeClr val="tx1"/>
+                </a:solidFill>
+                <a:latin typeface="+mn-lt"/>
+                <a:ea typeface="+mn-ea"/>
+                <a:cs typeface="+mn-cs"/>
+              </a:rPr>
+              <a:t>GRaph</a:t>
+            </a:r>
+            <a:r>
+              <a:rPr lang="en-US" sz="1200" kern="1200" dirty="0" smtClean="0">
+                <a:solidFill>
+                  <a:schemeClr val="tx1"/>
+                </a:solidFill>
+                <a:latin typeface="+mn-lt"/>
+                <a:ea typeface="+mn-ea"/>
+                <a:cs typeface="+mn-cs"/>
+              </a:rPr>
+              <a:t> store And </a:t>
+            </a:r>
+            <a:r>
+              <a:rPr lang="en-US" sz="1200" kern="1200" dirty="0" err="1" smtClean="0">
+                <a:solidFill>
+                  <a:schemeClr val="tx1"/>
+                </a:solidFill>
+                <a:latin typeface="+mn-lt"/>
+                <a:ea typeface="+mn-ea"/>
+                <a:cs typeface="+mn-cs"/>
+              </a:rPr>
+              <a:t>Sparql</a:t>
+            </a:r>
+            <a:r>
+              <a:rPr lang="en-US" sz="1200" kern="1200" dirty="0" smtClean="0">
+                <a:solidFill>
+                  <a:schemeClr val="tx1"/>
+                </a:solidFill>
+                <a:latin typeface="+mn-lt"/>
+                <a:ea typeface="+mn-ea"/>
+                <a:cs typeface="+mn-cs"/>
+              </a:rPr>
+              <a:t> Protocol),</a:t>
             </a:r>
             <a:endParaRPr lang="en-GB" dirty="0"/>
           </a:p>
@@ -1079,7 +1144,7 @@
                 <a:ea typeface="+mn-ea"/>
                 <a:cs typeface="+mn-cs"/>
               </a:rPr>
-              <a:t>and to enable </a:t>
+              <a:t>which is a set of </a:t>
             </a:r>
             <a:r>
               <a:rPr lang="en-US" sz="1200" kern="1200" dirty="0" err="1" smtClean="0">
@@ -1090,7 +1155,7 @@
                 <a:ea typeface="+mn-ea"/>
                 <a:cs typeface="+mn-cs"/>
               </a:rPr>
-              <a:t>MarkLogic</a:t>
+              <a:t>XQuery</a:t>
             </a:r>
             <a:r>
               <a:rPr lang="en-US" sz="1200" kern="1200" dirty="0" smtClean="0">
@@ -1101,7 +1166,7 @@
                 <a:ea typeface="+mn-ea"/>
                 <a:cs typeface="+mn-cs"/>
               </a:rPr>
-              <a:t> to interact directly with these data sources I've been </a:t>
+              <a:t> libraries that implement the client end of these </a:t>
             </a:r>
             <a:br>
               <a:rPr lang="en-US" sz="1200" kern="1200" dirty="0" smtClean="0">
@@ -1122,10 +1187,10 @@
                 <a:ea typeface="+mn-ea"/>
                 <a:cs typeface="+mn-cs"/>
               </a:rPr>
-              <a:t>developing GRASP (</a:t>
-            </a:r>
-            <a:r>
-              <a:rPr lang="en-US" sz="1200" kern="1200" dirty="0" err="1" smtClean="0">
+              <a:t>protocols.</a:t>
+            </a:r>
+            <a:br>
+              <a:rPr lang="en-US" sz="1200" kern="1200" dirty="0" smtClean="0">
                 <a:solidFill>
                   <a:schemeClr val="tx1"/>
                 </a:solidFill>
@@ -1133,41 +1198,7 @@
                 <a:ea typeface="+mn-ea"/>
                 <a:cs typeface="+mn-cs"/>
               </a:rPr>
-              <a:t>GRaph</a:t>
-            </a:r>
-            <a:r>
-              <a:rPr lang="en-US" sz="1200" kern="1200" dirty="0" smtClean="0">
-                <a:solidFill>
-                  <a:schemeClr val="tx1"/>
-                </a:solidFill>
-                <a:latin typeface="+mn-lt"/>
-                <a:ea typeface="+mn-ea"/>
-                <a:cs typeface="+mn-cs"/>
-              </a:rPr>
-              <a:t> store And </a:t>
-            </a:r>
-            <a:r>
-              <a:rPr lang="en-US" sz="1200" kern="1200" dirty="0" err="1" smtClean="0">
-                <a:solidFill>
-                  <a:schemeClr val="tx1"/>
-                </a:solidFill>
-                <a:latin typeface="+mn-lt"/>
-                <a:ea typeface="+mn-ea"/>
-                <a:cs typeface="+mn-cs"/>
-              </a:rPr>
-              <a:t>Sparql</a:t>
-            </a:r>
-            <a:r>
-              <a:rPr lang="en-US" sz="1200" kern="1200" dirty="0" smtClean="0">
-                <a:solidFill>
-                  <a:schemeClr val="tx1"/>
-                </a:solidFill>
-                <a:latin typeface="+mn-lt"/>
-                <a:ea typeface="+mn-ea"/>
-                <a:cs typeface="+mn-cs"/>
-              </a:rPr>
-              <a:t> Protocol),</a:t>
-            </a:r>
+            </a:br>
             <a:endParaRPr lang="en-GB" dirty="0"/>
           </a:p>
         </p:txBody>
@@ -1190,7 +1221,7 @@
             <a:fld id="{708EA56A-F1B3-4F1F-ACD0-DEC49C4A85DD}" type="slidenum">
               <a:rPr lang="en-US" smtClean="0"/>
               <a:pPr/>
-              <a:t>16</a:t>
+              <a:t>17</a:t>
             </a:fld>
             <a:endParaRPr lang="en-US" dirty="0"/>
           </a:p>
@@ -1259,10 +1290,10 @@
                 <a:ea typeface="+mn-ea"/>
                 <a:cs typeface="+mn-cs"/>
               </a:rPr>
-              <a:t>which is a set of </a:t>
-            </a:r>
-            <a:r>
-              <a:rPr lang="en-US" sz="1200" kern="1200" dirty="0" err="1" smtClean="0">
+              <a:t>and provide a wide range of convenience functions that simplify making the HTTP </a:t>
+            </a:r>
+            <a:br>
+              <a:rPr lang="en-US" sz="1200" kern="1200" dirty="0" smtClean="0">
                 <a:solidFill>
                   <a:schemeClr val="tx1"/>
                 </a:solidFill>
@@ -1270,8 +1301,7 @@
                 <a:ea typeface="+mn-ea"/>
                 <a:cs typeface="+mn-cs"/>
               </a:rPr>
-              <a:t>XQuery</a:t>
-            </a:r>
+            </a:br>
             <a:r>
               <a:rPr lang="en-US" sz="1200" kern="1200" dirty="0" smtClean="0">
                 <a:solidFill>
@@ -1281,39 +1311,8 @@
                 <a:ea typeface="+mn-ea"/>
                 <a:cs typeface="+mn-cs"/>
               </a:rPr>
-              <a:t> libraries that implement the client end of these </a:t>
-            </a:r>
-            <a:br>
-              <a:rPr lang="en-US" sz="1200" kern="1200" dirty="0" smtClean="0">
-                <a:solidFill>
-                  <a:schemeClr val="tx1"/>
-                </a:solidFill>
-                <a:latin typeface="+mn-lt"/>
-                <a:ea typeface="+mn-ea"/>
-                <a:cs typeface="+mn-cs"/>
-              </a:rPr>
-            </a:br>
-            <a:r>
-              <a:rPr lang="en-US" sz="1200" kern="1200" dirty="0" smtClean="0">
-                <a:solidFill>
-                  <a:schemeClr val="tx1"/>
-                </a:solidFill>
-                <a:latin typeface="+mn-lt"/>
-                <a:ea typeface="+mn-ea"/>
-                <a:cs typeface="+mn-cs"/>
-              </a:rPr>
-              <a:t>protocols.</a:t>
-            </a:r>
-            <a:br>
-              <a:rPr lang="en-US" sz="1200" kern="1200" dirty="0" smtClean="0">
-                <a:solidFill>
-                  <a:schemeClr val="tx1"/>
-                </a:solidFill>
-                <a:latin typeface="+mn-lt"/>
-                <a:ea typeface="+mn-ea"/>
-                <a:cs typeface="+mn-cs"/>
-              </a:rPr>
-            </a:br>
+              <a:t>requests to Graph Stores that support these protocols.</a:t>
+            </a:r>
             <a:endParaRPr lang="en-GB" dirty="0"/>
           </a:p>
         </p:txBody>
@@ -1405,7 +1404,7 @@
                 <a:ea typeface="+mn-ea"/>
                 <a:cs typeface="+mn-cs"/>
               </a:rPr>
-              <a:t>and provide a wide range of convenience functions that simplify making the HTTP </a:t>
+              <a:t>Why so many functions when one or two, with a pile of optional arguments, would </a:t>
             </a:r>
             <a:br>
               <a:rPr lang="en-US" sz="1200" kern="1200" dirty="0" smtClean="0">
@@ -1426,7 +1425,7 @@
                 <a:ea typeface="+mn-ea"/>
                 <a:cs typeface="+mn-cs"/>
               </a:rPr>
-              <a:t>requests to Graph Stores that support these protocols.</a:t>
+              <a:t>do? </a:t>
             </a:r>
             <a:endParaRPr lang="en-GB" dirty="0"/>
           </a:p>
@@ -1519,28 +1518,7 @@
                 <a:ea typeface="+mn-ea"/>
                 <a:cs typeface="+mn-cs"/>
               </a:rPr>
-              <a:t>Why so many functions when one or two, with a pile of optional arguments, would </a:t>
-            </a:r>
-            <a:br>
-              <a:rPr lang="en-US" sz="1200" kern="1200" dirty="0" smtClean="0">
-                <a:solidFill>
-                  <a:schemeClr val="tx1"/>
-                </a:solidFill>
-                <a:latin typeface="+mn-lt"/>
-                <a:ea typeface="+mn-ea"/>
-                <a:cs typeface="+mn-cs"/>
-              </a:rPr>
-            </a:br>
-            <a:r>
-              <a:rPr lang="en-US" sz="1200" kern="1200" dirty="0" smtClean="0">
-                <a:solidFill>
-                  <a:schemeClr val="tx1"/>
-                </a:solidFill>
-                <a:latin typeface="+mn-lt"/>
-                <a:ea typeface="+mn-ea"/>
-                <a:cs typeface="+mn-cs"/>
-              </a:rPr>
-              <a:t>do? </a:t>
+              <a:t>The simple answer is, I don't like too 'arguments'.</a:t>
             </a:r>
             <a:endParaRPr lang="en-GB" dirty="0"/>
           </a:p>
@@ -1633,7 +1611,28 @@
                 <a:ea typeface="+mn-ea"/>
                 <a:cs typeface="+mn-cs"/>
               </a:rPr>
-              <a:t>The simple answer is, I don't like too 'arguments'.</a:t>
+              <a:t>Well, I don't like too many optional arguments where some have to be set as an </a:t>
+            </a:r>
+            <a:br>
+              <a:rPr lang="en-US" sz="1200" kern="1200" dirty="0" smtClean="0">
+                <a:solidFill>
+                  <a:schemeClr val="tx1"/>
+                </a:solidFill>
+                <a:latin typeface="+mn-lt"/>
+                <a:ea typeface="+mn-ea"/>
+                <a:cs typeface="+mn-cs"/>
+              </a:rPr>
+            </a:br>
+            <a:r>
+              <a:rPr lang="en-US" sz="1200" kern="1200" dirty="0" smtClean="0">
+                <a:solidFill>
+                  <a:schemeClr val="tx1"/>
+                </a:solidFill>
+                <a:latin typeface="+mn-lt"/>
+                <a:ea typeface="+mn-ea"/>
+                <a:cs typeface="+mn-cs"/>
+              </a:rPr>
+              <a:t>empty sequence in order to pad the way to setting others.</a:t>
             </a:r>
             <a:endParaRPr lang="en-GB" dirty="0"/>
           </a:p>
@@ -1726,10 +1725,10 @@
                 <a:ea typeface="+mn-ea"/>
                 <a:cs typeface="+mn-cs"/>
               </a:rPr>
-              <a:t>Well, I don't like too many optional arguments where some have to be set as an </a:t>
-            </a:r>
-            <a:br>
-              <a:rPr lang="en-US" sz="1200" kern="1200" dirty="0" smtClean="0">
+              <a:t>Basically, these functions are wrappers for their respective </a:t>
+            </a:r>
+            <a:r>
+              <a:rPr lang="en-US" sz="1200" kern="1200" dirty="0" err="1" smtClean="0">
                 <a:solidFill>
                   <a:schemeClr val="tx1"/>
                 </a:solidFill>
@@ -1737,7 +1736,8 @@
                 <a:ea typeface="+mn-ea"/>
                 <a:cs typeface="+mn-cs"/>
               </a:rPr>
-            </a:br>
+              <a:t>RESTful</a:t>
+            </a:r>
             <a:r>
               <a:rPr lang="en-US" sz="1200" kern="1200" dirty="0" smtClean="0">
                 <a:solidFill>
@@ -1747,7 +1747,72 @@
                 <a:ea typeface="+mn-ea"/>
                 <a:cs typeface="+mn-cs"/>
               </a:rPr>
-              <a:t>empty sequence in order to pad the way to setting others.</a:t>
+              <a:t> actions and,</a:t>
+            </a:r>
+            <a:br>
+              <a:rPr lang="en-US" sz="1200" kern="1200" dirty="0" smtClean="0">
+                <a:solidFill>
+                  <a:schemeClr val="tx1"/>
+                </a:solidFill>
+                <a:latin typeface="+mn-lt"/>
+                <a:ea typeface="+mn-ea"/>
+                <a:cs typeface="+mn-cs"/>
+              </a:rPr>
+            </a:br>
+            <a:r>
+              <a:rPr lang="en-US" sz="1200" kern="1200" dirty="0" smtClean="0">
+                <a:solidFill>
+                  <a:schemeClr val="tx1"/>
+                </a:solidFill>
+                <a:latin typeface="+mn-lt"/>
+                <a:ea typeface="+mn-ea"/>
+                <a:cs typeface="+mn-cs"/>
+              </a:rPr>
+              <a:t>in effect, provide a </a:t>
+            </a:r>
+            <a:r>
+              <a:rPr lang="en-US" sz="1200" kern="1200" dirty="0" err="1" smtClean="0">
+                <a:solidFill>
+                  <a:schemeClr val="tx1"/>
+                </a:solidFill>
+                <a:latin typeface="+mn-lt"/>
+                <a:ea typeface="+mn-ea"/>
+                <a:cs typeface="+mn-cs"/>
+              </a:rPr>
+              <a:t>RESTful</a:t>
+            </a:r>
+            <a:r>
+              <a:rPr lang="en-US" sz="1200" kern="1200" dirty="0" smtClean="0">
+                <a:solidFill>
+                  <a:schemeClr val="tx1"/>
+                </a:solidFill>
+                <a:latin typeface="+mn-lt"/>
+                <a:ea typeface="+mn-ea"/>
+                <a:cs typeface="+mn-cs"/>
+              </a:rPr>
+              <a:t> </a:t>
+            </a:r>
+            <a:r>
+              <a:rPr lang="en-US" sz="1200" kern="1200" dirty="0" err="1" smtClean="0">
+                <a:solidFill>
+                  <a:schemeClr val="tx1"/>
+                </a:solidFill>
+                <a:latin typeface="+mn-lt"/>
+                <a:ea typeface="+mn-ea"/>
+                <a:cs typeface="+mn-cs"/>
+              </a:rPr>
+              <a:t>interafce</a:t>
+            </a:r>
+            <a:r>
+              <a:rPr lang="en-US" sz="1200" kern="1200" dirty="0" smtClean="0">
+                <a:solidFill>
+                  <a:schemeClr val="tx1"/>
+                </a:solidFill>
+                <a:latin typeface="+mn-lt"/>
+                <a:ea typeface="+mn-ea"/>
+                <a:cs typeface="+mn-cs"/>
+              </a:rPr>
+              <a:t> to a Graph Store.</a:t>
             </a:r>
             <a:endParaRPr lang="en-GB" dirty="0"/>
           </a:p>
@@ -1933,94 +1998,7 @@
                 <a:ea typeface="+mn-ea"/>
                 <a:cs typeface="+mn-cs"/>
               </a:rPr>
-              <a:t>Basically, these functions are wrappers for their respective </a:t>
-            </a:r>
-            <a:r>
-              <a:rPr lang="en-US" sz="1200" kern="1200" dirty="0" err="1" smtClean="0">
-                <a:solidFill>
-                  <a:schemeClr val="tx1"/>
-                </a:solidFill>
-                <a:latin typeface="+mn-lt"/>
-                <a:ea typeface="+mn-ea"/>
-                <a:cs typeface="+mn-cs"/>
-              </a:rPr>
-              <a:t>RESTful</a:t>
-            </a:r>
-            <a:r>
-              <a:rPr lang="en-US" sz="1200" kern="1200" dirty="0" smtClean="0">
-                <a:solidFill>
-                  <a:schemeClr val="tx1"/>
-                </a:solidFill>
-                <a:latin typeface="+mn-lt"/>
-                <a:ea typeface="+mn-ea"/>
-                <a:cs typeface="+mn-cs"/>
-              </a:rPr>
-              <a:t> actions and,</a:t>
-            </a:r>
-            <a:br>
-              <a:rPr lang="en-US" sz="1200" kern="1200" dirty="0" smtClean="0">
-                <a:solidFill>
-                  <a:schemeClr val="tx1"/>
-                </a:solidFill>
-                <a:latin typeface="+mn-lt"/>
-                <a:ea typeface="+mn-ea"/>
-                <a:cs typeface="+mn-cs"/>
-              </a:rPr>
-            </a:br>
-            <a:r>
-              <a:rPr lang="en-US" sz="1200" kern="1200" dirty="0" smtClean="0">
-                <a:solidFill>
-                  <a:schemeClr val="tx1"/>
-                </a:solidFill>
-                <a:latin typeface="+mn-lt"/>
-                <a:ea typeface="+mn-ea"/>
-                <a:cs typeface="+mn-cs"/>
-              </a:rPr>
-              <a:t>in effect, provide a </a:t>
-            </a:r>
-            <a:r>
-              <a:rPr lang="en-US" sz="1200" kern="1200" dirty="0" err="1" smtClean="0">
-                <a:solidFill>
-                  <a:schemeClr val="tx1"/>
-                </a:solidFill>
-                <a:latin typeface="+mn-lt"/>
-                <a:ea typeface="+mn-ea"/>
-                <a:cs typeface="+mn-cs"/>
-              </a:rPr>
-              <a:t>RESTful</a:t>
-            </a:r>
-            <a:r>
-              <a:rPr lang="en-US" sz="1200" kern="1200" dirty="0" smtClean="0">
-                <a:solidFill>
-                  <a:schemeClr val="tx1"/>
-                </a:solidFill>
-                <a:latin typeface="+mn-lt"/>
-                <a:ea typeface="+mn-ea"/>
-                <a:cs typeface="+mn-cs"/>
-              </a:rPr>
-              <a:t> </a:t>
-            </a:r>
-            <a:r>
-              <a:rPr lang="en-US" sz="1200" kern="1200" dirty="0" err="1" smtClean="0">
-                <a:solidFill>
-                  <a:schemeClr val="tx1"/>
-                </a:solidFill>
-                <a:latin typeface="+mn-lt"/>
-                <a:ea typeface="+mn-ea"/>
-                <a:cs typeface="+mn-cs"/>
-              </a:rPr>
-              <a:t>interafce</a:t>
-            </a:r>
-            <a:r>
-              <a:rPr lang="en-US" sz="1200" kern="1200" dirty="0" smtClean="0">
-                <a:solidFill>
-                  <a:schemeClr val="tx1"/>
-                </a:solidFill>
-                <a:latin typeface="+mn-lt"/>
-                <a:ea typeface="+mn-ea"/>
-                <a:cs typeface="+mn-cs"/>
-              </a:rPr>
-              <a:t> to a Graph Store.</a:t>
+              <a:t>The Linked Open Data Cloud has grown considerable in just five years.</a:t>
             </a:r>
             <a:endParaRPr lang="en-GB" dirty="0"/>
           </a:p>
@@ -2113,7 +2091,29 @@
                 <a:ea typeface="+mn-ea"/>
                 <a:cs typeface="+mn-cs"/>
               </a:rPr>
-              <a:t>The Linked Open Data Cloud has grown considerable in just five years.</a:t>
+              <a:t>If the rate at which the Linked Open Data Cloud has expanded over the last five years is anything to go by, the ability of businesses to interact with such a richly inter-linked source of information will be the defining factor in the </a:t>
+            </a:r>
+            <a:r>
+              <a:rPr lang="en-US" sz="1200" kern="1200" dirty="0" err="1" smtClean="0">
+                <a:solidFill>
+                  <a:schemeClr val="tx1"/>
+                </a:solidFill>
+                <a:latin typeface="+mn-lt"/>
+                <a:ea typeface="+mn-ea"/>
+                <a:cs typeface="+mn-cs"/>
+              </a:rPr>
+              <a:t>realistion</a:t>
+            </a:r>
+            <a:r>
+              <a:rPr lang="en-US" sz="1200" kern="1200" dirty="0" smtClean="0">
+                <a:solidFill>
+                  <a:schemeClr val="tx1"/>
+                </a:solidFill>
+                <a:latin typeface="+mn-lt"/>
+                <a:ea typeface="+mn-ea"/>
+                <a:cs typeface="+mn-cs"/>
+              </a:rPr>
+              <a:t> of Big Data's potential.</a:t>
             </a:r>
             <a:endParaRPr lang="en-GB" dirty="0"/>
           </a:p>
@@ -2197,40 +2197,7 @@
           </a:bodyPr>
           <a:lstStyle/>
           <a:p>
-            <a:r>
-              <a:rPr lang="en-US" sz="1200" kern="1200" dirty="0" smtClean="0">
-                <a:solidFill>
-                  <a:schemeClr val="tx1"/>
-                </a:solidFill>
-                <a:latin typeface="+mn-lt"/>
-                <a:ea typeface="+mn-ea"/>
-                <a:cs typeface="+mn-cs"/>
-              </a:rPr>
-              <a:t>If the rate at which the Linked Open Data Cloud has expanded over the last five years is anything to go by, the ability of businesses to interact with such a richly inter-linked source of information will be the defining factor in the </a:t>
-            </a:r>
-            <a:r>
-              <a:rPr lang="en-US" sz="1200" kern="1200" dirty="0" err="1" smtClean="0">
-                <a:solidFill>
-                  <a:schemeClr val="tx1"/>
-                </a:solidFill>
-                <a:latin typeface="+mn-lt"/>
-                <a:ea typeface="+mn-ea"/>
-                <a:cs typeface="+mn-cs"/>
-              </a:rPr>
-              <a:t>realistion</a:t>
-            </a:r>
-            <a:r>
-              <a:rPr lang="en-US" sz="1200" kern="1200" dirty="0" smtClean="0">
-                <a:solidFill>
-                  <a:schemeClr val="tx1"/>
-                </a:solidFill>
-                <a:latin typeface="+mn-lt"/>
-                <a:ea typeface="+mn-ea"/>
-                <a:cs typeface="+mn-cs"/>
-              </a:rPr>
-              <a:t> of Big Data's potential.</a:t>
-            </a:r>
-            <a:endParaRPr lang="en-GB" dirty="0"/>
+            <a:endParaRPr lang="en-US" dirty="0"/>
           </a:p>
         </p:txBody>
       </p:sp>
@@ -2252,89 +2219,7 @@
             <a:fld id="{708EA56A-F1B3-4F1F-ACD0-DEC49C4A85DD}" type="slidenum">
               <a:rPr lang="en-US" smtClean="0"/>
               <a:pPr/>
-              <a:t>25</a:t>
-            </a:fld>
-            <a:endParaRPr lang="en-US" dirty="0"/>
-          </a:p>
-        </p:txBody>
-      </p:sp>
-    </p:spTree>
-  </p:cSld>
-  <p:clrMapOvr>
-    <a:masterClrMapping/>
-  </p:clrMapOvr>
-</p:notes>
-</file>
-
-<file path=ppt/notesSlides/notesSlide23.xml><?xml version="1.0" encoding="utf-8"?>
-<p:notes xmlns:a="http://schemas.openxmlformats.org/drawingml/2006/main" xmlns:r="http://schemas.openxmlformats.org/officeDocument/2006/relationships" xmlns:p="http://schemas.openxmlformats.org/presentationml/2006/main">
-  <p:cSld>
-    <p:spTree>
-      <p:nvGrpSpPr>
-        <p:cNvPr id="1" name=""/>
-        <p:cNvGrpSpPr/>
-        <p:nvPr/>
-      </p:nvGrpSpPr>
-      <p:grpSpPr>
-        <a:xfrm>
-          <a:off x="0" y="0"/>
-          <a:ext cx="0" cy="0"/>
-          <a:chOff x="0" y="0"/>
-          <a:chExt cx="0" cy="0"/>
-        </a:xfrm>
-      </p:grpSpPr>
-      <p:sp>
-        <p:nvSpPr>
-          <p:cNvPr id="2" name="Slide Image Placeholder 1"/>
-          <p:cNvSpPr>
-            <a:spLocks noGrp="1" noRot="1" noChangeAspect="1"/>
-          </p:cNvSpPr>
-          <p:nvPr>
-            <p:ph type="sldImg"/>
-          </p:nvPr>
-        </p:nvSpPr>
-        <p:spPr/>
-      </p:sp>
-      <p:sp>
-        <p:nvSpPr>
-          <p:cNvPr id="3" name="Notes Placeholder 2"/>
-          <p:cNvSpPr>
-            <a:spLocks noGrp="1"/>
-          </p:cNvSpPr>
-          <p:nvPr>
-            <p:ph type="body" idx="1"/>
-          </p:nvPr>
-        </p:nvSpPr>
-        <p:spPr/>
-        <p:txBody>
-          <a:bodyPr>
-            <a:normAutofit/>
-          </a:bodyPr>
-          <a:lstStyle/>
-          <a:p>
-            <a:endParaRPr lang="en-US" dirty="0"/>
-          </a:p>
-        </p:txBody>
-      </p:sp>
-      <p:sp>
-        <p:nvSpPr>
-          <p:cNvPr id="4" name="Slide Number Placeholder 3"/>
-          <p:cNvSpPr>
-            <a:spLocks noGrp="1"/>
-          </p:cNvSpPr>
-          <p:nvPr>
-            <p:ph type="sldNum" sz="quarter" idx="10"/>
-          </p:nvPr>
-        </p:nvSpPr>
-        <p:spPr/>
-        <p:txBody>
-          <a:bodyPr/>
-          <a:lstStyle/>
-          <a:p>
-            <a:fld id="{708EA56A-F1B3-4F1F-ACD0-DEC49C4A85DD}" type="slidenum">
-              <a:rPr lang="en-US" smtClean="0"/>
-              <a:pPr/>
-              <a:t>27</a:t>
+              <a:t>26</a:t>
             </a:fld>
             <a:endParaRPr lang="en-US" dirty="0"/>
           </a:p>
@@ -2851,6 +2736,23 @@
           </a:bodyPr>
           <a:lstStyle/>
           <a:p>
+            <a:pPr marL="0" marR="0" indent="0" algn="l" defTabSz="914400" rtl="0" eaLnBrk="1" fontAlgn="auto" latinLnBrk="0" hangingPunct="1">
+              <a:lnSpc>
+                <a:spcPct val="100000"/>
+              </a:lnSpc>
+              <a:spcBef>
+                <a:spcPts val="0"/>
+              </a:spcBef>
+              <a:spcAft>
+                <a:spcPts val="0"/>
+              </a:spcAft>
+              <a:buClrTx/>
+              <a:buSzTx/>
+              <a:buFontTx/>
+              <a:buNone/>
+              <a:tabLst/>
+              <a:defRPr/>
+            </a:pPr>
             <a:r>
               <a:rPr lang="en-US" sz="1200" kern="1200" dirty="0" smtClean="0">
                 <a:solidFill>
@@ -2860,29 +2762,11 @@
                 <a:ea typeface="+mn-ea"/>
                 <a:cs typeface="+mn-cs"/>
               </a:rPr>
-              <a:t>is built upon the foundations of the Semantic Web technologies </a:t>
-            </a:r>
-            <a:br>
-              <a:rPr lang="en-US" sz="1200" kern="1200" dirty="0" smtClean="0">
-                <a:solidFill>
-                  <a:schemeClr val="tx1"/>
-                </a:solidFill>
-                <a:latin typeface="+mn-lt"/>
-                <a:ea typeface="+mn-ea"/>
-                <a:cs typeface="+mn-cs"/>
-              </a:rPr>
-            </a:br>
-            <a:r>
-              <a:rPr lang="en-US" sz="1200" kern="1200" dirty="0" smtClean="0">
-                <a:solidFill>
-                  <a:schemeClr val="tx1"/>
-                </a:solidFill>
-                <a:latin typeface="+mn-lt"/>
-                <a:ea typeface="+mn-ea"/>
-                <a:cs typeface="+mn-cs"/>
-              </a:rPr>
-              <a:t>and as such is exposed as</a:t>
-            </a:r>
+              <a:t>RDF Graphs and queried via the SPARQL query language.</a:t>
+            </a:r>
+            <a:endParaRPr lang="en-GB" dirty="0" smtClean="0"/>
+          </a:p>
+          <a:p>
             <a:endParaRPr lang="en-GB" dirty="0"/>
           </a:p>
         </p:txBody>
@@ -2965,23 +2849,6 @@
           </a:bodyPr>
           <a:lstStyle/>
           <a:p>
-            <a:pPr marL="0" marR="0" indent="0" algn="l" defTabSz="914400" rtl="0" eaLnBrk="1" fontAlgn="auto" latinLnBrk="0" hangingPunct="1">
-              <a:lnSpc>
-                <a:spcPct val="100000"/>
-              </a:lnSpc>
-              <a:spcBef>
-                <a:spcPts val="0"/>
-              </a:spcBef>
-              <a:spcAft>
-                <a:spcPts val="0"/>
-              </a:spcAft>
-              <a:buClrTx/>
-              <a:buSzTx/>
-              <a:buFontTx/>
-              <a:buNone/>
-              <a:tabLst/>
-              <a:defRPr/>
-            </a:pPr>
             <a:r>
               <a:rPr lang="en-US" sz="1200" kern="1200" dirty="0" smtClean="0">
                 <a:solidFill>
@@ -2991,11 +2858,51 @@
                 <a:ea typeface="+mn-ea"/>
                 <a:cs typeface="+mn-cs"/>
               </a:rPr>
-              <a:t>RDF Graphs and queried via the SPARQL query language.</a:t>
-            </a:r>
-            <a:endParaRPr lang="en-GB" dirty="0" smtClean="0"/>
-          </a:p>
-          <a:p>
+              <a:t>Due to the historical lack of standard protocols for </a:t>
+            </a:r>
+            <a:r>
+              <a:rPr lang="en-US" sz="1200" kern="1200" dirty="0" err="1" smtClean="0">
+                <a:solidFill>
+                  <a:schemeClr val="tx1"/>
+                </a:solidFill>
+                <a:latin typeface="+mn-lt"/>
+                <a:ea typeface="+mn-ea"/>
+                <a:cs typeface="+mn-cs"/>
+              </a:rPr>
+              <a:t>acceessing</a:t>
+            </a:r>
+            <a:r>
+              <a:rPr lang="en-US" sz="1200" kern="1200" dirty="0" smtClean="0">
+                <a:solidFill>
+                  <a:schemeClr val="tx1"/>
+                </a:solidFill>
+                <a:latin typeface="+mn-lt"/>
+                <a:ea typeface="+mn-ea"/>
+                <a:cs typeface="+mn-cs"/>
+              </a:rPr>
+              <a:t> these </a:t>
+            </a:r>
+            <a:br>
+              <a:rPr lang="en-US" sz="1200" kern="1200" dirty="0" smtClean="0">
+                <a:solidFill>
+                  <a:schemeClr val="tx1"/>
+                </a:solidFill>
+                <a:latin typeface="+mn-lt"/>
+                <a:ea typeface="+mn-ea"/>
+                <a:cs typeface="+mn-cs"/>
+              </a:rPr>
+            </a:br>
+            <a:r>
+              <a:rPr lang="en-US" sz="1200" kern="1200" dirty="0" smtClean="0">
+                <a:solidFill>
+                  <a:schemeClr val="tx1"/>
+                </a:solidFill>
+                <a:latin typeface="+mn-lt"/>
+                <a:ea typeface="+mn-ea"/>
+                <a:cs typeface="+mn-cs"/>
+              </a:rPr>
+              <a:t>repositories </a:t>
+            </a:r>
             <a:endParaRPr lang="en-GB" dirty="0"/>
           </a:p>
         </p:txBody>
@@ -3087,10 +2994,10 @@
                 <a:ea typeface="+mn-ea"/>
                 <a:cs typeface="+mn-cs"/>
               </a:rPr>
-              <a:t>Due to the historical lack of standard protocols for </a:t>
-            </a:r>
-            <a:r>
-              <a:rPr lang="en-US" sz="1200" kern="1200" dirty="0" err="1" smtClean="0">
+              <a:t>it has lead to a variety of implementation specific APIs to load and query the </a:t>
+            </a:r>
+            <a:br>
+              <a:rPr lang="en-US" sz="1200" kern="1200" dirty="0" smtClean="0">
                 <a:solidFill>
                   <a:schemeClr val="tx1"/>
                 </a:solidFill>
@@ -3098,8 +3005,7 @@
                 <a:ea typeface="+mn-ea"/>
                 <a:cs typeface="+mn-cs"/>
               </a:rPr>
-              <a:t>acceessing</a:t>
-            </a:r>
+            </a:br>
             <a:r>
               <a:rPr lang="en-US" sz="1200" kern="1200" dirty="0" smtClean="0">
                 <a:solidFill>
@@ -3109,28 +3015,7 @@
                 <a:ea typeface="+mn-ea"/>
                 <a:cs typeface="+mn-cs"/>
               </a:rPr>
-              <a:t> these </a:t>
-            </a:r>
-            <a:br>
-              <a:rPr lang="en-US" sz="1200" kern="1200" dirty="0" smtClean="0">
-                <a:solidFill>
-                  <a:schemeClr val="tx1"/>
-                </a:solidFill>
-                <a:latin typeface="+mn-lt"/>
-                <a:ea typeface="+mn-ea"/>
-                <a:cs typeface="+mn-cs"/>
-              </a:rPr>
-            </a:br>
-            <a:r>
-              <a:rPr lang="en-US" sz="1200" kern="1200" dirty="0" smtClean="0">
-                <a:solidFill>
-                  <a:schemeClr val="tx1"/>
-                </a:solidFill>
-                <a:latin typeface="+mn-lt"/>
-                <a:ea typeface="+mn-ea"/>
-                <a:cs typeface="+mn-cs"/>
-              </a:rPr>
-              <a:t>repositories </a:t>
+              <a:t>data sets held within </a:t>
             </a:r>
             <a:endParaRPr lang="en-GB" dirty="0"/>
           </a:p>
@@ -5908,20 +5793,20 @@
               </a:spcBef>
             </a:pPr>
             <a:r>
-              <a:rPr lang="en-GB" sz="3200" dirty="0" smtClean="0"/>
-              <a:t>...leads to </a:t>
-            </a:r>
-            <a:r>
-              <a:rPr lang="en-GB" sz="3200" dirty="0" smtClean="0">
+              <a:rPr lang="en-US" sz="3200" noProof="0" dirty="0" smtClean="0"/>
+              <a:t>and additional </a:t>
+            </a:r>
+            <a:r>
+              <a:rPr lang="en-US" sz="3200" noProof="0" dirty="0" smtClean="0">
                 <a:solidFill>
                   <a:srgbClr val="C00000"/>
                 </a:solidFill>
               </a:rPr>
-              <a:t>implementation specific</a:t>
-            </a:r>
-            <a:r>
-              <a:rPr lang="en-GB" sz="3200" dirty="0" smtClean="0"/>
-              <a:t> APIs</a:t>
+              <a:t>complexity</a:t>
+            </a:r>
+            <a:r>
+              <a:rPr lang="en-US" sz="3200" noProof="0" dirty="0" smtClean="0"/>
+              <a:t> </a:t>
             </a:r>
             <a:endParaRPr kumimoji="0" lang="en-GB" sz="3200" i="0" u="none" strike="noStrike" kern="1200" cap="none" spc="0" normalizeH="0" baseline="0" noProof="0" dirty="0">
               <a:ln>
@@ -5987,8 +5872,8 @@
         </p:nvSpPr>
         <p:spPr>
           <a:xfrm>
-            <a:off x="685800" y="1772816"/>
-            <a:ext cx="7772400" cy="1514599"/>
+            <a:off x="685800" y="2037520"/>
+            <a:ext cx="7772400" cy="2029154"/>
           </a:xfrm>
           <a:prstGeom prst="rect">
             <a:avLst/>
@@ -6005,29 +5890,69 @@
             </a:pPr>
             <a:r>
               <a:rPr lang="en-US" sz="3200" noProof="0" dirty="0" smtClean="0"/>
-              <a:t>and additional </a:t>
-            </a:r>
-            <a:r>
-              <a:rPr lang="en-US" sz="3200" noProof="0" dirty="0" smtClean="0">
+              <a:t>New protocols from the W3C</a:t>
+            </a:r>
+          </a:p>
+          <a:p>
+            <a:pPr marL="288925" lvl="1">
+              <a:spcBef>
+                <a:spcPct val="0"/>
+              </a:spcBef>
+            </a:pPr>
+            <a:endParaRPr lang="it-IT" sz="2000" dirty="0" smtClean="0"/>
+          </a:p>
+          <a:p>
+            <a:pPr marL="1660525" lvl="4">
+              <a:spcBef>
+                <a:spcPct val="0"/>
+              </a:spcBef>
+            </a:pPr>
+            <a:r>
+              <a:rPr lang="it-IT" sz="2000" dirty="0" smtClean="0">
                 <a:solidFill>
                   <a:srgbClr val="C00000"/>
                 </a:solidFill>
               </a:rPr>
-              <a:t>co</a:t>
-            </a:r>
-            <a:r>
-              <a:rPr lang="en-US" sz="3200" noProof="0" dirty="0" smtClean="0">
+              <a:t>SPARQL 1.1 Graph Store HTTP Protocol</a:t>
+            </a:r>
+          </a:p>
+          <a:p>
+            <a:pPr marL="1660525" lvl="4">
+              <a:spcBef>
+                <a:spcPct val="0"/>
+              </a:spcBef>
+            </a:pPr>
+            <a:r>
+              <a:rPr lang="it-IT" sz="2000" dirty="0" smtClean="0">
                 <a:solidFill>
                   <a:srgbClr val="C00000"/>
                 </a:solidFill>
               </a:rPr>
-              <a:t>mplexity</a:t>
-            </a:r>
-            <a:r>
-              <a:rPr lang="en-US" sz="3200" noProof="0" dirty="0" smtClean="0"/>
-              <a:t> </a:t>
-            </a:r>
-            <a:endParaRPr kumimoji="0" lang="en-GB" sz="3200" i="0" u="none" strike="noStrike" kern="1200" cap="none" spc="0" normalizeH="0" baseline="0" noProof="0" dirty="0">
+              <a:t/>
+            </a:r>
+            <a:br>
+              <a:rPr lang="it-IT" sz="2000" dirty="0" smtClean="0">
+                <a:solidFill>
+                  <a:srgbClr val="C00000"/>
+                </a:solidFill>
+              </a:rPr>
+            </a:br>
+            <a:r>
+              <a:rPr lang="it-IT" sz="2000" dirty="0" smtClean="0">
+                <a:solidFill>
+                  <a:srgbClr val="C00000"/>
+                </a:solidFill>
+              </a:rPr>
+              <a:t>SPARQL 1.1 Protocol</a:t>
+            </a:r>
+          </a:p>
+          <a:p>
+            <a:pPr marL="1660525" lvl="4">
+              <a:spcBef>
+                <a:spcPct val="0"/>
+              </a:spcBef>
+            </a:pPr>
+            <a:endParaRPr kumimoji="0" lang="en-GB" sz="2000" i="0" u="none" strike="noStrike" kern="1200" cap="none" spc="0" normalizeH="0" baseline="0" noProof="0" dirty="0">
               <a:ln>
                 <a:noFill/>
               </a:ln>
@@ -6091,8 +6016,8 @@
         </p:nvSpPr>
         <p:spPr>
           <a:xfrm>
-            <a:off x="685800" y="2037520"/>
-            <a:ext cx="7772400" cy="2029154"/>
+            <a:off x="685800" y="1989392"/>
+            <a:ext cx="7772400" cy="1186943"/>
           </a:xfrm>
           <a:prstGeom prst="rect">
             <a:avLst/>
@@ -6108,20 +6033,13 @@
               </a:spcBef>
             </a:pPr>
             <a:r>
-              <a:rPr lang="en-US" sz="3200" noProof="0" dirty="0" smtClean="0"/>
-              <a:t>New </a:t>
-            </a:r>
-            <a:r>
-              <a:rPr lang="en-US" sz="3200" noProof="0" dirty="0" smtClean="0"/>
-              <a:t>protocols </a:t>
-            </a:r>
-            <a:r>
-              <a:rPr lang="en-US" sz="3200" noProof="0" dirty="0" smtClean="0"/>
-              <a:t>from the W3C</a:t>
-            </a:r>
-          </a:p>
-          <a:p>
-            <a:pPr marL="288925" lvl="1">
+              <a:rPr lang="it-IT" sz="3200" dirty="0" smtClean="0"/>
+              <a:t>SPARQL 1.1 Graph Store HTTP Protocol</a:t>
+            </a:r>
+            <a:endParaRPr lang="en-US" sz="3200" noProof="0" dirty="0" smtClean="0"/>
+          </a:p>
+          <a:p>
+            <a:pPr marL="288925" lvl="1" algn="ctr">
               <a:spcBef>
                 <a:spcPct val="0"/>
               </a:spcBef>
@@ -6129,7 +6047,7 @@
             <a:endParaRPr lang="it-IT" sz="2000" dirty="0" smtClean="0"/>
           </a:p>
           <a:p>
-            <a:pPr marL="1660525" lvl="4">
+            <a:pPr marL="288925" lvl="1" algn="ctr">
               <a:spcBef>
                 <a:spcPct val="0"/>
               </a:spcBef>
@@ -6140,61 +6058,8 @@
                   <a:srgbClr val="C00000"/>
                 </a:solidFill>
               </a:rPr>
-              <a:t>SPARQL 1.1 Graph Store HTTP Protocol</a:t>
-            </a:r>
-          </a:p>
-          <a:p>
-            <a:pPr marL="1660525" lvl="4">
-              <a:spcBef>
-                <a:spcPct val="0"/>
-              </a:spcBef>
-            </a:pPr>
-            <a:r>
-              <a:rPr lang="it-IT" sz="2000" dirty="0" smtClean="0">
-                <a:solidFill>
-                  <a:srgbClr val="C00000"/>
-                </a:solidFill>
-              </a:rPr>
-              <a:t/>
-            </a:r>
-            <a:br>
-              <a:rPr lang="it-IT" sz="2000" dirty="0" smtClean="0">
-                <a:solidFill>
-                  <a:srgbClr val="C00000"/>
-                </a:solidFill>
-              </a:rPr>
-            </a:br>
-            <a:r>
-              <a:rPr lang="it-IT" sz="2000" dirty="0" smtClean="0">
-                <a:solidFill>
-                  <a:srgbClr val="C00000"/>
-                </a:solidFill>
-              </a:rPr>
-              <a:t>SPARQL 1.1 Protocol</a:t>
-            </a:r>
-          </a:p>
-          <a:p>
-            <a:pPr marL="1660525" lvl="4">
-              <a:spcBef>
-                <a:spcPct val="0"/>
-              </a:spcBef>
-            </a:pPr>
-            <a:endParaRPr kumimoji="0" lang="en-GB" sz="2000" i="0" u="none" strike="noStrike" kern="1200" cap="none" spc="0" normalizeH="0" baseline="0" noProof="0" dirty="0">
-              <a:ln>
-                <a:noFill/>
-              </a:ln>
-              <a:solidFill>
-                <a:schemeClr val="tx1">
-                  <a:lumMod val="50000"/>
-                </a:schemeClr>
-              </a:solidFill>
-              <a:effectLst/>
-              <a:uLnTx/>
-              <a:uFillTx/>
-              <a:latin typeface="Tahoma" pitchFamily="34" charset="0"/>
-              <a:ea typeface="Tahoma" pitchFamily="34" charset="0"/>
-              <a:cs typeface="Tahoma" pitchFamily="34" charset="0"/>
-            </a:endParaRPr>
+              <a:t>Graph Dataset Management over HTTP</a:t>
+            </a:r>
           </a:p>
         </p:txBody>
       </p:sp>
@@ -6243,8 +6108,8 @@
         </p:nvSpPr>
         <p:spPr>
           <a:xfrm>
-            <a:off x="685800" y="1989392"/>
-            <a:ext cx="7772400" cy="1186943"/>
+            <a:off x="685800" y="2097680"/>
+            <a:ext cx="7772400" cy="1271164"/>
           </a:xfrm>
           <a:prstGeom prst="rect">
             <a:avLst/>
@@ -6261,7 +6126,7 @@
             </a:pPr>
             <a:r>
               <a:rPr lang="it-IT" sz="3200" dirty="0" smtClean="0"/>
-              <a:t>SPARQL 1.1 Graph Store HTTP Protocol</a:t>
+              <a:t>SPARQL 1.1 Protocol</a:t>
             </a:r>
             <a:endParaRPr lang="en-US" sz="3200" noProof="0" dirty="0" smtClean="0"/>
           </a:p>
@@ -6285,8 +6150,31 @@
                   <a:srgbClr val="C00000"/>
                 </a:solidFill>
               </a:rPr>
-              <a:t>Graph Dataset Management over HTTP</a:t>
-            </a:r>
+              <a:t>SPARQL Queries over HTTP</a:t>
+            </a:r>
+          </a:p>
+          <a:p>
+            <a:pPr marL="1660525" lvl="4">
+              <a:spcBef>
+                <a:spcPct val="0"/>
+              </a:spcBef>
+            </a:pPr>
+            <a:endParaRPr kumimoji="0" lang="en-GB" sz="2000" i="0" u="none" strike="noStrike" kern="1200" cap="none" spc="0" normalizeH="0" baseline="0" noProof="0" dirty="0">
+              <a:ln>
+                <a:noFill/>
+              </a:ln>
+              <a:solidFill>
+                <a:schemeClr val="tx1">
+                  <a:lumMod val="50000"/>
+                </a:schemeClr>
+              </a:solidFill>
+              <a:effectLst/>
+              <a:uLnTx/>
+              <a:uFillTx/>
+              <a:latin typeface="Tahoma" pitchFamily="34" charset="0"/>
+              <a:ea typeface="Tahoma" pitchFamily="34" charset="0"/>
+              <a:cs typeface="Tahoma" pitchFamily="34" charset="0"/>
+            </a:endParaRPr>
           </a:p>
         </p:txBody>
       </p:sp>
@@ -6335,8 +6223,8 @@
         </p:nvSpPr>
         <p:spPr>
           <a:xfrm>
-            <a:off x="685800" y="2097680"/>
-            <a:ext cx="7772400" cy="1271164"/>
+            <a:off x="685800" y="1772816"/>
+            <a:ext cx="7772400" cy="1514599"/>
           </a:xfrm>
           <a:prstGeom prst="rect">
             <a:avLst/>
@@ -6352,41 +6240,78 @@
               </a:spcBef>
             </a:pPr>
             <a:r>
-              <a:rPr lang="it-IT" sz="3200" dirty="0" smtClean="0"/>
-              <a:t>SPARQL 1.1 Protocol</a:t>
-            </a:r>
-            <a:endParaRPr lang="en-US" sz="3200" noProof="0" dirty="0" smtClean="0"/>
-          </a:p>
-          <a:p>
-            <a:pPr marL="288925" lvl="1" algn="ctr">
-              <a:spcBef>
-                <a:spcPct val="0"/>
-              </a:spcBef>
-            </a:pPr>
-            <a:endParaRPr lang="it-IT" sz="2000" dirty="0" smtClean="0"/>
-          </a:p>
-          <a:p>
-            <a:pPr marL="288925" lvl="1" algn="ctr">
-              <a:spcBef>
-                <a:spcPct val="0"/>
-              </a:spcBef>
-            </a:pPr>
-            <a:r>
-              <a:rPr lang="it-IT" sz="2000" dirty="0" smtClean="0">
+              <a:rPr kumimoji="0" lang="en-US" sz="3200" i="0" u="none" strike="noStrike" kern="1200" cap="none" spc="0" normalizeH="0" baseline="0" dirty="0" smtClean="0">
+                <a:ln>
+                  <a:noFill/>
+                </a:ln>
                 <a:solidFill>
                   <a:srgbClr val="C00000"/>
                 </a:solidFill>
-              </a:rPr>
-              <a:t>SPARQL Queries over HTTP</a:t>
-            </a:r>
-          </a:p>
-          <a:p>
-            <a:pPr marL="1660525" lvl="4">
-              <a:spcBef>
-                <a:spcPct val="0"/>
-              </a:spcBef>
-            </a:pPr>
-            <a:endParaRPr kumimoji="0" lang="en-GB" sz="2000" i="0" u="none" strike="noStrike" kern="1200" cap="none" spc="0" normalizeH="0" baseline="0" noProof="0" dirty="0">
+                <a:effectLst/>
+                <a:uLnTx/>
+                <a:uFillTx/>
+                <a:latin typeface="Tahoma" pitchFamily="34" charset="0"/>
+                <a:ea typeface="Tahoma" pitchFamily="34" charset="0"/>
+                <a:cs typeface="Tahoma" pitchFamily="34" charset="0"/>
+              </a:rPr>
+              <a:t>Support</a:t>
+            </a:r>
+            <a:r>
+              <a:rPr kumimoji="0" lang="en-US" sz="3200" i="0" u="none" strike="noStrike" kern="1200" cap="none" spc="0" normalizeH="0" baseline="0" dirty="0" smtClean="0">
+                <a:ln>
+                  <a:noFill/>
+                </a:ln>
+                <a:solidFill>
+                  <a:schemeClr val="tx1">
+                    <a:lumMod val="50000"/>
+                  </a:schemeClr>
+                </a:solidFill>
+                <a:effectLst/>
+                <a:uLnTx/>
+                <a:uFillTx/>
+                <a:latin typeface="Tahoma" pitchFamily="34" charset="0"/>
+                <a:ea typeface="Tahoma" pitchFamily="34" charset="0"/>
+                <a:cs typeface="Tahoma" pitchFamily="34" charset="0"/>
+              </a:rPr>
+              <a:t> is </a:t>
+            </a:r>
+            <a:r>
+              <a:rPr kumimoji="0" lang="en-US" sz="3200" i="0" u="none" strike="noStrike" kern="1200" cap="none" spc="0" normalizeH="0" baseline="0" dirty="0" smtClean="0">
+                <a:ln>
+                  <a:noFill/>
+                </a:ln>
+                <a:solidFill>
+                  <a:srgbClr val="C00000"/>
+                </a:solidFill>
+                <a:effectLst/>
+                <a:uLnTx/>
+                <a:uFillTx/>
+                <a:latin typeface="Tahoma" pitchFamily="34" charset="0"/>
+                <a:ea typeface="Tahoma" pitchFamily="34" charset="0"/>
+                <a:cs typeface="Tahoma" pitchFamily="34" charset="0"/>
+              </a:rPr>
+              <a:t>Growing</a:t>
+            </a:r>
+            <a:r>
+              <a:rPr kumimoji="0" lang="en-US" sz="3200" i="0" u="none" strike="noStrike" kern="1200" cap="none" spc="0" normalizeH="0" baseline="0" dirty="0" smtClean="0">
+                <a:ln>
+                  <a:noFill/>
+                </a:ln>
+                <a:solidFill>
+                  <a:schemeClr val="tx1">
+                    <a:lumMod val="50000"/>
+                  </a:schemeClr>
+                </a:solidFill>
+                <a:effectLst/>
+                <a:uLnTx/>
+                <a:uFillTx/>
+                <a:latin typeface="Tahoma" pitchFamily="34" charset="0"/>
+                <a:ea typeface="Tahoma" pitchFamily="34" charset="0"/>
+                <a:cs typeface="Tahoma" pitchFamily="34" charset="0"/>
+              </a:rPr>
+              <a:t> for these protocols</a:t>
+            </a:r>
+            <a:endParaRPr kumimoji="0" lang="en-GB" sz="3200" i="0" u="none" strike="noStrike" kern="1200" cap="none" spc="0" normalizeH="0" baseline="0" noProof="0" dirty="0">
               <a:ln>
                 <a:noFill/>
               </a:ln>
@@ -6467,95 +6392,67 @@
               </a:spcBef>
             </a:pPr>
             <a:r>
-              <a:rPr kumimoji="0" lang="en-US" sz="3200" i="0" u="none" strike="noStrike" kern="1200" cap="none" spc="0" normalizeH="0" baseline="0" dirty="0" smtClean="0">
-                <a:ln>
-                  <a:noFill/>
-                </a:ln>
+              <a:rPr lang="en-US" sz="3200" dirty="0" smtClean="0"/>
+              <a:t>GRASP </a:t>
+            </a:r>
+          </a:p>
+          <a:p>
+            <a:pPr lvl="0" algn="ctr">
+              <a:spcBef>
+                <a:spcPct val="0"/>
+              </a:spcBef>
+            </a:pPr>
+            <a:r>
+              <a:rPr lang="en-US" sz="3200" u="sng" dirty="0" err="1" smtClean="0">
                 <a:solidFill>
                   <a:srgbClr val="C00000"/>
                 </a:solidFill>
-                <a:effectLst/>
-                <a:uLnTx/>
-                <a:uFillTx/>
-                <a:latin typeface="Tahoma" pitchFamily="34" charset="0"/>
-                <a:ea typeface="Tahoma" pitchFamily="34" charset="0"/>
-                <a:cs typeface="Tahoma" pitchFamily="34" charset="0"/>
-              </a:rPr>
-              <a:t>Support</a:t>
-            </a:r>
-            <a:r>
-              <a:rPr kumimoji="0" lang="en-US" sz="3200" i="0" u="none" strike="noStrike" kern="1200" cap="none" spc="0" normalizeH="0" baseline="0" dirty="0" smtClean="0">
-                <a:ln>
-                  <a:noFill/>
-                </a:ln>
-                <a:solidFill>
-                  <a:schemeClr val="tx1">
-                    <a:lumMod val="50000"/>
-                  </a:schemeClr>
-                </a:solidFill>
-                <a:effectLst/>
-                <a:uLnTx/>
-                <a:uFillTx/>
-                <a:latin typeface="Tahoma" pitchFamily="34" charset="0"/>
-                <a:ea typeface="Tahoma" pitchFamily="34" charset="0"/>
-                <a:cs typeface="Tahoma" pitchFamily="34" charset="0"/>
-              </a:rPr>
-              <a:t> is </a:t>
-            </a:r>
-            <a:r>
-              <a:rPr kumimoji="0" lang="en-US" sz="3200" i="0" u="none" strike="noStrike" kern="1200" cap="none" spc="0" normalizeH="0" baseline="0" dirty="0" smtClean="0">
-                <a:ln>
-                  <a:noFill/>
-                </a:ln>
+              </a:rPr>
+              <a:t>GR</a:t>
+            </a:r>
+            <a:r>
+              <a:rPr lang="en-US" sz="3200" dirty="0" err="1" smtClean="0"/>
+              <a:t>aph</a:t>
+            </a:r>
+            <a:r>
+              <a:rPr lang="en-US" sz="3200" dirty="0" smtClean="0"/>
+              <a:t> store </a:t>
+            </a:r>
+            <a:r>
+              <a:rPr lang="en-US" sz="3200" u="sng" dirty="0" smtClean="0">
                 <a:solidFill>
                   <a:srgbClr val="C00000"/>
                 </a:solidFill>
-                <a:effectLst/>
-                <a:uLnTx/>
-                <a:uFillTx/>
-                <a:latin typeface="Tahoma" pitchFamily="34" charset="0"/>
-                <a:ea typeface="Tahoma" pitchFamily="34" charset="0"/>
-                <a:cs typeface="Tahoma" pitchFamily="34" charset="0"/>
-              </a:rPr>
-              <a:t>Growing</a:t>
-            </a:r>
-            <a:r>
-              <a:rPr kumimoji="0" lang="en-US" sz="3200" i="0" u="none" strike="noStrike" kern="1200" cap="none" spc="0" normalizeH="0" baseline="0" dirty="0" smtClean="0">
-                <a:ln>
-                  <a:noFill/>
-                </a:ln>
-                <a:solidFill>
-                  <a:schemeClr val="tx1">
-                    <a:lumMod val="50000"/>
-                  </a:schemeClr>
-                </a:solidFill>
-                <a:effectLst/>
-                <a:uLnTx/>
-                <a:uFillTx/>
-                <a:latin typeface="Tahoma" pitchFamily="34" charset="0"/>
-                <a:ea typeface="Tahoma" pitchFamily="34" charset="0"/>
-                <a:cs typeface="Tahoma" pitchFamily="34" charset="0"/>
-              </a:rPr>
-              <a:t> for these </a:t>
-            </a:r>
-            <a:r>
-              <a:rPr kumimoji="0" lang="en-US" sz="3200" i="0" u="none" strike="noStrike" kern="1200" cap="none" spc="0" normalizeH="0" baseline="0" dirty="0" smtClean="0">
-                <a:ln>
-                  <a:noFill/>
-                </a:ln>
-                <a:solidFill>
-                  <a:schemeClr val="tx1">
-                    <a:lumMod val="50000"/>
-                  </a:schemeClr>
-                </a:solidFill>
-                <a:effectLst/>
-                <a:uLnTx/>
-                <a:uFillTx/>
-                <a:latin typeface="Tahoma" pitchFamily="34" charset="0"/>
-                <a:ea typeface="Tahoma" pitchFamily="34" charset="0"/>
-                <a:cs typeface="Tahoma" pitchFamily="34" charset="0"/>
-              </a:rPr>
-              <a:t>protocols</a:t>
+              </a:rPr>
+              <a:t>A</a:t>
+            </a:r>
+            <a:r>
+              <a:rPr lang="en-US" sz="3200" dirty="0" smtClean="0"/>
+              <a:t>nd </a:t>
+            </a:r>
+            <a:r>
+              <a:rPr lang="en-US" sz="3200" u="sng" dirty="0" smtClean="0">
+                <a:solidFill>
+                  <a:srgbClr val="C00000"/>
+                </a:solidFill>
+              </a:rPr>
+              <a:t>S</a:t>
+            </a:r>
+            <a:r>
+              <a:rPr lang="en-US" sz="3200" dirty="0" smtClean="0"/>
+              <a:t>PARQL </a:t>
+            </a:r>
+            <a:r>
+              <a:rPr lang="en-US" sz="3200" u="sng" dirty="0" smtClean="0">
+                <a:solidFill>
+                  <a:srgbClr val="C00000"/>
+                </a:solidFill>
+              </a:rPr>
+              <a:t>P</a:t>
+            </a:r>
+            <a:r>
+              <a:rPr lang="en-US" sz="3200" dirty="0" smtClean="0"/>
+              <a:t>rotocol</a:t>
             </a:r>
             <a:endParaRPr kumimoji="0" lang="en-GB" sz="3200" i="0" u="none" strike="noStrike" kern="1200" cap="none" spc="0" normalizeH="0" baseline="0" noProof="0" dirty="0">
               <a:ln>
@@ -6621,8 +6518,8 @@
         </p:nvSpPr>
         <p:spPr>
           <a:xfrm>
-            <a:off x="685800" y="1772816"/>
-            <a:ext cx="7772400" cy="1514599"/>
+            <a:off x="685800" y="1929232"/>
+            <a:ext cx="7772400" cy="1271164"/>
           </a:xfrm>
           <a:prstGeom prst="rect">
             <a:avLst/>
@@ -6639,68 +6536,43 @@
             </a:pPr>
             <a:r>
               <a:rPr lang="en-US" sz="3200" dirty="0" smtClean="0"/>
-              <a:t>GRASP </a:t>
-            </a:r>
-          </a:p>
-          <a:p>
-            <a:pPr lvl="0" algn="ctr">
+              <a:t>A </a:t>
+            </a:r>
+            <a:r>
+              <a:rPr lang="en-US" sz="3200" dirty="0" err="1" smtClean="0">
+                <a:solidFill>
+                  <a:srgbClr val="C00000"/>
+                </a:solidFill>
+              </a:rPr>
+              <a:t>GitHub</a:t>
+            </a:r>
+            <a:r>
+              <a:rPr lang="en-US" sz="3200" dirty="0" smtClean="0"/>
+              <a:t> project</a:t>
+            </a:r>
+            <a:endParaRPr lang="en-US" sz="3200" noProof="0" dirty="0" smtClean="0"/>
+          </a:p>
+          <a:p>
+            <a:pPr marL="288925" lvl="1" algn="ctr">
               <a:spcBef>
                 <a:spcPct val="0"/>
               </a:spcBef>
             </a:pPr>
-            <a:r>
-              <a:rPr lang="en-US" sz="3200" u="sng" dirty="0" err="1" smtClean="0">
-                <a:solidFill>
-                  <a:srgbClr val="C00000"/>
-                </a:solidFill>
-              </a:rPr>
-              <a:t>GR</a:t>
-            </a:r>
-            <a:r>
-              <a:rPr lang="en-US" sz="3200" dirty="0" err="1" smtClean="0"/>
-              <a:t>aph</a:t>
-            </a:r>
-            <a:r>
-              <a:rPr lang="en-US" sz="3200" dirty="0" smtClean="0"/>
-              <a:t> store </a:t>
-            </a:r>
-            <a:r>
-              <a:rPr lang="en-US" sz="3200" u="sng" dirty="0" smtClean="0">
-                <a:solidFill>
-                  <a:srgbClr val="C00000"/>
-                </a:solidFill>
-              </a:rPr>
-              <a:t>A</a:t>
-            </a:r>
-            <a:r>
-              <a:rPr lang="en-US" sz="3200" dirty="0" smtClean="0"/>
-              <a:t>nd </a:t>
-            </a:r>
-            <a:r>
-              <a:rPr lang="en-US" sz="3200" u="sng" dirty="0" smtClean="0">
-                <a:solidFill>
-                  <a:srgbClr val="C00000"/>
-                </a:solidFill>
-              </a:rPr>
-              <a:t>S</a:t>
-            </a:r>
-            <a:r>
-              <a:rPr lang="en-US" sz="3200" dirty="0" smtClean="0"/>
-              <a:t>PARQL </a:t>
-            </a:r>
-            <a:r>
-              <a:rPr lang="en-US" sz="3200" u="sng" dirty="0" smtClean="0">
-                <a:solidFill>
-                  <a:srgbClr val="C00000"/>
-                </a:solidFill>
-              </a:rPr>
-              <a:t>P</a:t>
-            </a:r>
-            <a:r>
-              <a:rPr lang="en-US" sz="3200" dirty="0" smtClean="0"/>
-              <a:t>rotocol</a:t>
-            </a:r>
-            <a:endParaRPr kumimoji="0" lang="en-GB" sz="3200" i="0" u="none" strike="noStrike" kern="1200" cap="none" spc="0" normalizeH="0" baseline="0" noProof="0" dirty="0">
+            <a:endParaRPr lang="it-IT" sz="2000" dirty="0" smtClean="0"/>
+          </a:p>
+          <a:p>
+            <a:pPr marL="288925" lvl="1" algn="ctr">
+              <a:spcBef>
+                <a:spcPct val="0"/>
+              </a:spcBef>
+            </a:pPr>
+            <a:r>
+              <a:rPr lang="en-GB" sz="2000" dirty="0" smtClean="0">
+                <a:hlinkClick r:id="rId2"/>
+              </a:rPr>
+              <a:t>https://github.com/philipfennell/grasp</a:t>
+            </a:r>
+            <a:endParaRPr kumimoji="0" lang="en-GB" sz="2000" i="0" u="none" strike="noStrike" kern="1200" cap="none" spc="0" normalizeH="0" baseline="0" noProof="0" dirty="0">
               <a:ln>
                 <a:noFill/>
               </a:ln>
@@ -6764,8 +6636,8 @@
         </p:nvSpPr>
         <p:spPr>
           <a:xfrm>
-            <a:off x="685800" y="1929232"/>
-            <a:ext cx="7772400" cy="1271164"/>
+            <a:off x="685800" y="2037520"/>
+            <a:ext cx="7772400" cy="2029154"/>
           </a:xfrm>
           <a:prstGeom prst="rect">
             <a:avLst/>
@@ -6781,29 +6653,16 @@
               </a:spcBef>
             </a:pPr>
             <a:r>
-              <a:rPr lang="en-US" sz="3200" dirty="0" smtClean="0"/>
-              <a:t>A </a:t>
-            </a:r>
-            <a:r>
-              <a:rPr lang="en-US" sz="3200" dirty="0" err="1" smtClean="0">
-                <a:solidFill>
-                  <a:srgbClr val="C00000"/>
-                </a:solidFill>
-              </a:rPr>
-              <a:t>GitHub</a:t>
-            </a:r>
-            <a:r>
-              <a:rPr lang="en-US" sz="3200" dirty="0" smtClean="0"/>
-              <a:t> </a:t>
-            </a:r>
-            <a:r>
-              <a:rPr lang="en-US" sz="3200" dirty="0" smtClean="0"/>
-              <a:t>project</a:t>
-            </a:r>
-            <a:endParaRPr lang="en-US" sz="3200" noProof="0" dirty="0" smtClean="0"/>
-          </a:p>
-          <a:p>
-            <a:pPr marL="288925" lvl="1" algn="ctr">
+              <a:rPr lang="en-US" sz="3200" noProof="0" dirty="0" err="1" smtClean="0"/>
+              <a:t>XQuery</a:t>
+            </a:r>
+            <a:r>
+              <a:rPr lang="en-US" sz="3200" noProof="0" dirty="0" smtClean="0"/>
+              <a:t> client libraries</a:t>
+            </a:r>
+          </a:p>
+          <a:p>
+            <a:pPr marL="288925" lvl="1">
               <a:spcBef>
                 <a:spcPct val="0"/>
               </a:spcBef>
@@ -6811,17 +6670,84 @@
             <a:endParaRPr lang="it-IT" sz="2000" dirty="0" smtClean="0"/>
           </a:p>
           <a:p>
-            <a:pPr marL="288925" lvl="1" algn="ctr">
+            <a:pPr marL="1660525" lvl="4">
               <a:spcBef>
                 <a:spcPct val="0"/>
               </a:spcBef>
             </a:pPr>
             <a:r>
-              <a:rPr lang="en-GB" sz="2000" dirty="0" smtClean="0">
-                <a:hlinkClick r:id="rId2"/>
-              </a:rPr>
-              <a:t>https://github.com/philipfennell/grasp</a:t>
-            </a:r>
+              <a:rPr lang="it-IT" sz="2000" b="1" dirty="0" smtClean="0">
+                <a:solidFill>
+                  <a:srgbClr val="C00000"/>
+                </a:solidFill>
+                <a:latin typeface="Courier New" pitchFamily="49" charset="0"/>
+                <a:cs typeface="Courier New" pitchFamily="49" charset="0"/>
+              </a:rPr>
+              <a:t>lib-gsp.xqy</a:t>
+            </a:r>
+            <a:r>
+              <a:rPr lang="it-IT" sz="2000" dirty="0" smtClean="0">
+                <a:solidFill>
+                  <a:srgbClr val="C00000"/>
+                </a:solidFill>
+              </a:rPr>
+              <a:t> </a:t>
+            </a:r>
+            <a:r>
+              <a:rPr lang="it-IT" sz="2000" dirty="0" smtClean="0"/>
+              <a:t>- Graph Store HTTP Protocol</a:t>
+            </a:r>
+          </a:p>
+          <a:p>
+            <a:pPr marL="1660525" lvl="4">
+              <a:spcBef>
+                <a:spcPct val="0"/>
+              </a:spcBef>
+            </a:pPr>
+            <a:r>
+              <a:rPr lang="it-IT" sz="2000" dirty="0" smtClean="0">
+                <a:solidFill>
+                  <a:srgbClr val="C00000"/>
+                </a:solidFill>
+              </a:rPr>
+              <a:t/>
+            </a:r>
+            <a:br>
+              <a:rPr lang="it-IT" sz="2000" dirty="0" smtClean="0">
+                <a:solidFill>
+                  <a:srgbClr val="C00000"/>
+                </a:solidFill>
+              </a:rPr>
+            </a:br>
+            <a:r>
+              <a:rPr lang="it-IT" sz="2000" b="1" dirty="0" smtClean="0">
+                <a:solidFill>
+                  <a:srgbClr val="C00000"/>
+                </a:solidFill>
+                <a:latin typeface="Courier New" pitchFamily="49" charset="0"/>
+                <a:cs typeface="Courier New" pitchFamily="49" charset="0"/>
+              </a:rPr>
+              <a:t>lib-spq.xqy</a:t>
+            </a:r>
+            <a:r>
+              <a:rPr lang="it-IT" sz="2000" dirty="0" smtClean="0">
+                <a:solidFill>
+                  <a:srgbClr val="C00000"/>
+                </a:solidFill>
+              </a:rPr>
+              <a:t> </a:t>
+            </a:r>
+            <a:r>
+              <a:rPr lang="it-IT" sz="2000" dirty="0" smtClean="0"/>
+              <a:t>- SPARQL Protocol</a:t>
+            </a:r>
+          </a:p>
+          <a:p>
+            <a:pPr marL="1660525" lvl="4">
+              <a:spcBef>
+                <a:spcPct val="0"/>
+              </a:spcBef>
+            </a:pPr>
             <a:endParaRPr kumimoji="0" lang="en-GB" sz="2000" i="0" u="none" strike="noStrike" kern="1200" cap="none" spc="0" normalizeH="0" baseline="0" noProof="0" dirty="0">
               <a:ln>
                 <a:noFill/>
@@ -6886,8 +6812,8 @@
         </p:nvSpPr>
         <p:spPr>
           <a:xfrm>
-            <a:off x="685800" y="2037520"/>
-            <a:ext cx="7772400" cy="2029154"/>
+            <a:off x="1756611" y="1913060"/>
+            <a:ext cx="5642810" cy="4596064"/>
           </a:xfrm>
           <a:prstGeom prst="rect">
             <a:avLst/>
@@ -6903,18 +6829,505 @@
               </a:spcBef>
             </a:pPr>
             <a:r>
-              <a:rPr lang="en-US" sz="3200" noProof="0" dirty="0" err="1" smtClean="0"/>
-              <a:t>XQuery</a:t>
+              <a:rPr lang="en-US" sz="3200" noProof="0" dirty="0" smtClean="0"/>
+              <a:t>A </a:t>
+            </a:r>
+            <a:r>
+              <a:rPr lang="en-US" sz="3200" noProof="0" dirty="0" smtClean="0">
+                <a:solidFill>
+                  <a:srgbClr val="C00000"/>
+                </a:solidFill>
+              </a:rPr>
+              <a:t>wide</a:t>
             </a:r>
             <a:r>
               <a:rPr lang="en-US" sz="3200" noProof="0" dirty="0" smtClean="0"/>
               <a:t> </a:t>
             </a:r>
             <a:r>
+              <a:rPr lang="en-US" sz="3200" noProof="0" dirty="0" smtClean="0">
+                <a:solidFill>
+                  <a:srgbClr val="C00000"/>
+                </a:solidFill>
+              </a:rPr>
+              <a:t>range</a:t>
+            </a:r>
+            <a:r>
               <a:rPr lang="en-US" sz="3200" noProof="0" dirty="0" smtClean="0"/>
-              <a:t>client libraries</a:t>
-            </a:r>
-            <a:endParaRPr lang="en-US" sz="3200" noProof="0" dirty="0" smtClean="0"/>
+              <a:t> </a:t>
+            </a:r>
+            <a:r>
+              <a:rPr lang="en-US" sz="3200" noProof="0" dirty="0" smtClean="0"/>
+              <a:t>of functions</a:t>
+            </a:r>
+          </a:p>
+          <a:p>
+            <a:pPr lvl="0" algn="ctr">
+              <a:spcBef>
+                <a:spcPct val="0"/>
+              </a:spcBef>
+            </a:pPr>
+            <a:endParaRPr lang="en-US" sz="1600" noProof="0" dirty="0" smtClean="0"/>
+          </a:p>
+          <a:p>
+            <a:pPr algn="ctr">
+              <a:spcBef>
+                <a:spcPct val="0"/>
+              </a:spcBef>
+            </a:pPr>
+            <a:r>
+              <a:rPr lang="en-GB" sz="1600" b="1" dirty="0" err="1" smtClean="0">
+                <a:solidFill>
+                  <a:schemeClr val="tx1">
+                    <a:lumMod val="60000"/>
+                    <a:lumOff val="40000"/>
+                  </a:schemeClr>
+                </a:solidFill>
+                <a:latin typeface="Courier New" pitchFamily="49" charset="0"/>
+                <a:cs typeface="Courier New" pitchFamily="49" charset="0"/>
+              </a:rPr>
+              <a:t>gsp:add</a:t>
+            </a:r>
+            <a:r>
+              <a:rPr lang="en-GB" sz="1600" b="1" dirty="0" smtClean="0">
+                <a:solidFill>
+                  <a:schemeClr val="tx1">
+                    <a:lumMod val="60000"/>
+                    <a:lumOff val="40000"/>
+                  </a:schemeClr>
+                </a:solidFill>
+                <a:latin typeface="Courier New" pitchFamily="49" charset="0"/>
+                <a:cs typeface="Courier New" pitchFamily="49" charset="0"/>
+              </a:rPr>
+              <a:t>-default-graph, </a:t>
+            </a:r>
+            <a:r>
+              <a:rPr lang="en-GB" sz="1600" b="1" dirty="0" err="1" smtClean="0">
+                <a:solidFill>
+                  <a:schemeClr val="tx1">
+                    <a:lumMod val="60000"/>
+                    <a:lumOff val="40000"/>
+                  </a:schemeClr>
+                </a:solidFill>
+                <a:latin typeface="Courier New" pitchFamily="49" charset="0"/>
+                <a:cs typeface="Courier New" pitchFamily="49" charset="0"/>
+              </a:rPr>
+              <a:t>gsp:add</a:t>
+            </a:r>
+            <a:r>
+              <a:rPr lang="en-GB" sz="1600" b="1" dirty="0" smtClean="0">
+                <a:solidFill>
+                  <a:schemeClr val="tx1">
+                    <a:lumMod val="60000"/>
+                    <a:lumOff val="40000"/>
+                  </a:schemeClr>
+                </a:solidFill>
+                <a:latin typeface="Courier New" pitchFamily="49" charset="0"/>
+                <a:cs typeface="Courier New" pitchFamily="49" charset="0"/>
+              </a:rPr>
+              <a:t>-named-graph, </a:t>
+            </a:r>
+            <a:r>
+              <a:rPr lang="en-GB" sz="1600" b="1" dirty="0" err="1" smtClean="0">
+                <a:solidFill>
+                  <a:schemeClr val="tx1">
+                    <a:lumMod val="60000"/>
+                    <a:lumOff val="40000"/>
+                  </a:schemeClr>
+                </a:solidFill>
+                <a:latin typeface="Courier New" pitchFamily="49" charset="0"/>
+                <a:cs typeface="Courier New" pitchFamily="49" charset="0"/>
+              </a:rPr>
+              <a:t>gsp:retrieve</a:t>
+            </a:r>
+            <a:r>
+              <a:rPr lang="en-GB" sz="1600" b="1" dirty="0" smtClean="0">
+                <a:solidFill>
+                  <a:schemeClr val="tx1">
+                    <a:lumMod val="60000"/>
+                    <a:lumOff val="40000"/>
+                  </a:schemeClr>
+                </a:solidFill>
+                <a:latin typeface="Courier New" pitchFamily="49" charset="0"/>
+                <a:cs typeface="Courier New" pitchFamily="49" charset="0"/>
+              </a:rPr>
+              <a:t>-default-graph-</a:t>
+            </a:r>
+            <a:r>
+              <a:rPr lang="en-GB" sz="1600" b="1" dirty="0" err="1" smtClean="0">
+                <a:solidFill>
+                  <a:schemeClr val="tx1">
+                    <a:lumMod val="60000"/>
+                    <a:lumOff val="40000"/>
+                  </a:schemeClr>
+                </a:solidFill>
+                <a:latin typeface="Courier New" pitchFamily="49" charset="0"/>
+                <a:cs typeface="Courier New" pitchFamily="49" charset="0"/>
+              </a:rPr>
+              <a:t>metainfo</a:t>
+            </a:r>
+            <a:r>
+              <a:rPr lang="en-GB" sz="1600" b="1" dirty="0" smtClean="0">
+                <a:solidFill>
+                  <a:schemeClr val="tx1">
+                    <a:lumMod val="60000"/>
+                    <a:lumOff val="40000"/>
+                  </a:schemeClr>
+                </a:solidFill>
+                <a:latin typeface="Courier New" pitchFamily="49" charset="0"/>
+                <a:cs typeface="Courier New" pitchFamily="49" charset="0"/>
+              </a:rPr>
+              <a:t>, </a:t>
+            </a:r>
+            <a:r>
+              <a:rPr lang="en-GB" sz="1600" b="1" dirty="0" err="1" smtClean="0">
+                <a:solidFill>
+                  <a:schemeClr val="tx1">
+                    <a:lumMod val="60000"/>
+                    <a:lumOff val="40000"/>
+                  </a:schemeClr>
+                </a:solidFill>
+                <a:latin typeface="Courier New" pitchFamily="49" charset="0"/>
+                <a:cs typeface="Courier New" pitchFamily="49" charset="0"/>
+              </a:rPr>
+              <a:t>gsp:retrieve</a:t>
+            </a:r>
+            <a:r>
+              <a:rPr lang="en-GB" sz="1600" b="1" dirty="0" smtClean="0">
+                <a:solidFill>
+                  <a:schemeClr val="tx1">
+                    <a:lumMod val="60000"/>
+                    <a:lumOff val="40000"/>
+                  </a:schemeClr>
+                </a:solidFill>
+                <a:latin typeface="Courier New" pitchFamily="49" charset="0"/>
+                <a:cs typeface="Courier New" pitchFamily="49" charset="0"/>
+              </a:rPr>
+              <a:t>-named-graph-</a:t>
+            </a:r>
+            <a:r>
+              <a:rPr lang="en-GB" sz="1600" b="1" dirty="0" err="1" smtClean="0">
+                <a:solidFill>
+                  <a:schemeClr val="tx1">
+                    <a:lumMod val="60000"/>
+                    <a:lumOff val="40000"/>
+                  </a:schemeClr>
+                </a:solidFill>
+                <a:latin typeface="Courier New" pitchFamily="49" charset="0"/>
+                <a:cs typeface="Courier New" pitchFamily="49" charset="0"/>
+              </a:rPr>
+              <a:t>metainfo</a:t>
+            </a:r>
+            <a:r>
+              <a:rPr lang="en-GB" sz="1600" b="1" dirty="0" smtClean="0">
+                <a:solidFill>
+                  <a:schemeClr val="tx1">
+                    <a:lumMod val="60000"/>
+                    <a:lumOff val="40000"/>
+                  </a:schemeClr>
+                </a:solidFill>
+                <a:latin typeface="Courier New" pitchFamily="49" charset="0"/>
+                <a:cs typeface="Courier New" pitchFamily="49" charset="0"/>
+              </a:rPr>
+              <a:t>, </a:t>
+            </a:r>
+          </a:p>
+          <a:p>
+            <a:pPr algn="ctr">
+              <a:spcBef>
+                <a:spcPct val="0"/>
+              </a:spcBef>
+            </a:pPr>
+            <a:r>
+              <a:rPr lang="en-GB" sz="1600" b="1" dirty="0" err="1" smtClean="0">
+                <a:solidFill>
+                  <a:schemeClr val="tx1">
+                    <a:lumMod val="60000"/>
+                    <a:lumOff val="40000"/>
+                  </a:schemeClr>
+                </a:solidFill>
+                <a:latin typeface="Courier New" pitchFamily="49" charset="0"/>
+                <a:cs typeface="Courier New" pitchFamily="49" charset="0"/>
+              </a:rPr>
+              <a:t>gsp:retrieve</a:t>
+            </a:r>
+            <a:r>
+              <a:rPr lang="en-GB" sz="1600" b="1" dirty="0" smtClean="0">
+                <a:solidFill>
+                  <a:schemeClr val="tx1">
+                    <a:lumMod val="60000"/>
+                    <a:lumOff val="40000"/>
+                  </a:schemeClr>
+                </a:solidFill>
+                <a:latin typeface="Courier New" pitchFamily="49" charset="0"/>
+                <a:cs typeface="Courier New" pitchFamily="49" charset="0"/>
+              </a:rPr>
+              <a:t>-default-graph, </a:t>
+            </a:r>
+          </a:p>
+          <a:p>
+            <a:pPr algn="ctr">
+              <a:spcBef>
+                <a:spcPct val="0"/>
+              </a:spcBef>
+            </a:pPr>
+            <a:r>
+              <a:rPr lang="en-GB" sz="1600" b="1" dirty="0" err="1" smtClean="0">
+                <a:solidFill>
+                  <a:schemeClr val="tx1">
+                    <a:lumMod val="60000"/>
+                    <a:lumOff val="40000"/>
+                  </a:schemeClr>
+                </a:solidFill>
+                <a:latin typeface="Courier New" pitchFamily="49" charset="0"/>
+                <a:cs typeface="Courier New" pitchFamily="49" charset="0"/>
+              </a:rPr>
+              <a:t>gsp:retrieve</a:t>
+            </a:r>
+            <a:r>
+              <a:rPr lang="en-GB" sz="1600" b="1" dirty="0" smtClean="0">
+                <a:solidFill>
+                  <a:schemeClr val="tx1">
+                    <a:lumMod val="60000"/>
+                    <a:lumOff val="40000"/>
+                  </a:schemeClr>
+                </a:solidFill>
+                <a:latin typeface="Courier New" pitchFamily="49" charset="0"/>
+                <a:cs typeface="Courier New" pitchFamily="49" charset="0"/>
+              </a:rPr>
+              <a:t>-named-graph, </a:t>
+            </a:r>
+          </a:p>
+          <a:p>
+            <a:pPr algn="ctr">
+              <a:spcBef>
+                <a:spcPct val="0"/>
+              </a:spcBef>
+            </a:pPr>
+            <a:r>
+              <a:rPr lang="en-GB" sz="1600" b="1" dirty="0" err="1" smtClean="0">
+                <a:solidFill>
+                  <a:schemeClr val="tx1">
+                    <a:lumMod val="60000"/>
+                    <a:lumOff val="40000"/>
+                  </a:schemeClr>
+                </a:solidFill>
+                <a:latin typeface="Courier New" pitchFamily="49" charset="0"/>
+                <a:cs typeface="Courier New" pitchFamily="49" charset="0"/>
+              </a:rPr>
+              <a:t>gsp:merge</a:t>
+            </a:r>
+            <a:r>
+              <a:rPr lang="en-GB" sz="1600" b="1" dirty="0" smtClean="0">
+                <a:solidFill>
+                  <a:schemeClr val="tx1">
+                    <a:lumMod val="60000"/>
+                    <a:lumOff val="40000"/>
+                  </a:schemeClr>
+                </a:solidFill>
+                <a:latin typeface="Courier New" pitchFamily="49" charset="0"/>
+                <a:cs typeface="Courier New" pitchFamily="49" charset="0"/>
+              </a:rPr>
+              <a:t>-default-graph, </a:t>
+            </a:r>
+          </a:p>
+          <a:p>
+            <a:pPr algn="ctr">
+              <a:spcBef>
+                <a:spcPct val="0"/>
+              </a:spcBef>
+            </a:pPr>
+            <a:r>
+              <a:rPr lang="en-GB" sz="1600" b="1" dirty="0" err="1" smtClean="0">
+                <a:solidFill>
+                  <a:schemeClr val="tx1">
+                    <a:lumMod val="60000"/>
+                    <a:lumOff val="40000"/>
+                  </a:schemeClr>
+                </a:solidFill>
+                <a:latin typeface="Courier New" pitchFamily="49" charset="0"/>
+                <a:cs typeface="Courier New" pitchFamily="49" charset="0"/>
+              </a:rPr>
+              <a:t>gsp:merge</a:t>
+            </a:r>
+            <a:r>
+              <a:rPr lang="en-GB" sz="1600" b="1" dirty="0" smtClean="0">
+                <a:solidFill>
+                  <a:schemeClr val="tx1">
+                    <a:lumMod val="60000"/>
+                    <a:lumOff val="40000"/>
+                  </a:schemeClr>
+                </a:solidFill>
+                <a:latin typeface="Courier New" pitchFamily="49" charset="0"/>
+                <a:cs typeface="Courier New" pitchFamily="49" charset="0"/>
+              </a:rPr>
+              <a:t>-named-graph, </a:t>
+            </a:r>
+          </a:p>
+          <a:p>
+            <a:pPr algn="ctr">
+              <a:spcBef>
+                <a:spcPct val="0"/>
+              </a:spcBef>
+            </a:pPr>
+            <a:r>
+              <a:rPr lang="en-GB" sz="1600" b="1" dirty="0" err="1" smtClean="0">
+                <a:solidFill>
+                  <a:schemeClr val="tx1">
+                    <a:lumMod val="60000"/>
+                    <a:lumOff val="40000"/>
+                  </a:schemeClr>
+                </a:solidFill>
+                <a:latin typeface="Courier New" pitchFamily="49" charset="0"/>
+                <a:cs typeface="Courier New" pitchFamily="49" charset="0"/>
+              </a:rPr>
+              <a:t>gsp:delete</a:t>
+            </a:r>
+            <a:r>
+              <a:rPr lang="en-GB" sz="1600" b="1" dirty="0" smtClean="0">
+                <a:solidFill>
+                  <a:schemeClr val="tx1">
+                    <a:lumMod val="60000"/>
+                    <a:lumOff val="40000"/>
+                  </a:schemeClr>
+                </a:solidFill>
+                <a:latin typeface="Courier New" pitchFamily="49" charset="0"/>
+                <a:cs typeface="Courier New" pitchFamily="49" charset="0"/>
+              </a:rPr>
+              <a:t>-default-graph, </a:t>
+            </a:r>
+          </a:p>
+          <a:p>
+            <a:pPr algn="ctr">
+              <a:spcBef>
+                <a:spcPct val="0"/>
+              </a:spcBef>
+            </a:pPr>
+            <a:r>
+              <a:rPr lang="en-GB" sz="1600" b="1" dirty="0" err="1" smtClean="0">
+                <a:solidFill>
+                  <a:schemeClr val="tx1">
+                    <a:lumMod val="60000"/>
+                    <a:lumOff val="40000"/>
+                  </a:schemeClr>
+                </a:solidFill>
+                <a:latin typeface="Courier New" pitchFamily="49" charset="0"/>
+                <a:cs typeface="Courier New" pitchFamily="49" charset="0"/>
+              </a:rPr>
+              <a:t>gsp:delete</a:t>
+            </a:r>
+            <a:r>
+              <a:rPr lang="en-GB" sz="1600" b="1" dirty="0" smtClean="0">
+                <a:solidFill>
+                  <a:schemeClr val="tx1">
+                    <a:lumMod val="60000"/>
+                    <a:lumOff val="40000"/>
+                  </a:schemeClr>
+                </a:solidFill>
+                <a:latin typeface="Courier New" pitchFamily="49" charset="0"/>
+                <a:cs typeface="Courier New" pitchFamily="49" charset="0"/>
+              </a:rPr>
+              <a:t>-named-graph, </a:t>
+            </a:r>
+            <a:r>
+              <a:rPr lang="en-GB" sz="1600" b="1" dirty="0" err="1" smtClean="0">
+                <a:solidFill>
+                  <a:schemeClr val="tx1">
+                    <a:lumMod val="60000"/>
+                    <a:lumOff val="40000"/>
+                  </a:schemeClr>
+                </a:solidFill>
+                <a:latin typeface="Courier New" pitchFamily="49" charset="0"/>
+                <a:cs typeface="Courier New" pitchFamily="49" charset="0"/>
+              </a:rPr>
+              <a:t>gsp:data</a:t>
+            </a:r>
+            <a:r>
+              <a:rPr lang="en-GB" sz="1600" b="1" dirty="0" smtClean="0">
+                <a:solidFill>
+                  <a:schemeClr val="tx1">
+                    <a:lumMod val="60000"/>
+                    <a:lumOff val="40000"/>
+                  </a:schemeClr>
+                </a:solidFill>
+                <a:latin typeface="Courier New" pitchFamily="49" charset="0"/>
+                <a:cs typeface="Courier New" pitchFamily="49" charset="0"/>
+              </a:rPr>
+              <a:t>, </a:t>
+            </a:r>
+          </a:p>
+          <a:p>
+            <a:pPr algn="ctr">
+              <a:spcBef>
+                <a:spcPct val="0"/>
+              </a:spcBef>
+            </a:pPr>
+            <a:r>
+              <a:rPr lang="en-GB" sz="1600" b="1" dirty="0" err="1" smtClean="0">
+                <a:solidFill>
+                  <a:schemeClr val="tx1">
+                    <a:lumMod val="60000"/>
+                    <a:lumOff val="40000"/>
+                  </a:schemeClr>
+                </a:solidFill>
+                <a:latin typeface="Courier New" pitchFamily="49" charset="0"/>
+                <a:cs typeface="Courier New" pitchFamily="49" charset="0"/>
+              </a:rPr>
+              <a:t>spq:query</a:t>
+            </a:r>
+            <a:r>
+              <a:rPr lang="en-GB" sz="1600" b="1" dirty="0" smtClean="0">
+                <a:solidFill>
+                  <a:schemeClr val="tx1">
+                    <a:lumMod val="60000"/>
+                    <a:lumOff val="40000"/>
+                  </a:schemeClr>
+                </a:solidFill>
+                <a:latin typeface="Courier New" pitchFamily="49" charset="0"/>
+                <a:cs typeface="Courier New" pitchFamily="49" charset="0"/>
+              </a:rPr>
+              <a:t>, </a:t>
+            </a:r>
+            <a:r>
+              <a:rPr lang="en-GB" sz="1600" b="1" dirty="0" err="1" smtClean="0">
+                <a:solidFill>
+                  <a:schemeClr val="tx1">
+                    <a:lumMod val="60000"/>
+                    <a:lumOff val="40000"/>
+                  </a:schemeClr>
+                </a:solidFill>
+                <a:latin typeface="Courier New" pitchFamily="49" charset="0"/>
+                <a:cs typeface="Courier New" pitchFamily="49" charset="0"/>
+              </a:rPr>
+              <a:t>spq:data</a:t>
+            </a:r>
+            <a:endParaRPr lang="en-GB" sz="1600" b="1" dirty="0" smtClean="0">
+              <a:solidFill>
+                <a:schemeClr val="tx1">
+                  <a:lumMod val="60000"/>
+                  <a:lumOff val="40000"/>
+                </a:schemeClr>
+              </a:solidFill>
+              <a:latin typeface="Courier New" pitchFamily="49" charset="0"/>
+              <a:cs typeface="Courier New" pitchFamily="49" charset="0"/>
+            </a:endParaRPr>
+          </a:p>
+          <a:p>
+            <a:pPr lvl="4">
+              <a:spcBef>
+                <a:spcPct val="0"/>
+              </a:spcBef>
+            </a:pPr>
+            <a:endParaRPr lang="en-US" sz="1600" b="1" noProof="0" dirty="0" smtClean="0">
+              <a:solidFill>
+                <a:schemeClr val="tx1">
+                  <a:lumMod val="60000"/>
+                  <a:lumOff val="40000"/>
+                </a:schemeClr>
+              </a:solidFill>
+              <a:latin typeface="Courier New" pitchFamily="49" charset="0"/>
+              <a:cs typeface="Courier New" pitchFamily="49" charset="0"/>
+            </a:endParaRPr>
           </a:p>
           <a:p>
             <a:pPr marL="288925" lvl="1">
@@ -6930,72 +7343,7 @@
                 <a:spcPct val="0"/>
               </a:spcBef>
             </a:pPr>
-            <a:r>
-              <a:rPr lang="it-IT" sz="2000" b="1" dirty="0" smtClean="0">
-                <a:solidFill>
-                  <a:srgbClr val="C00000"/>
-                </a:solidFill>
-                <a:latin typeface="Courier New" pitchFamily="49" charset="0"/>
-                <a:cs typeface="Courier New" pitchFamily="49" charset="0"/>
-              </a:rPr>
-              <a:t>lib-gsp.xqy</a:t>
-            </a:r>
-            <a:r>
-              <a:rPr lang="it-IT" sz="2000" dirty="0" smtClean="0">
-                <a:solidFill>
-                  <a:srgbClr val="C00000"/>
-                </a:solidFill>
-              </a:rPr>
-              <a:t> </a:t>
-            </a:r>
-            <a:r>
-              <a:rPr lang="it-IT" sz="2000" dirty="0" smtClean="0"/>
-              <a:t>- Graph Store HTTP Protocol</a:t>
-            </a:r>
-          </a:p>
-          <a:p>
-            <a:pPr marL="1660525" lvl="4">
-              <a:spcBef>
-                <a:spcPct val="0"/>
-              </a:spcBef>
-            </a:pPr>
-            <a:r>
-              <a:rPr lang="it-IT" sz="2000" dirty="0" smtClean="0">
-                <a:solidFill>
-                  <a:srgbClr val="C00000"/>
-                </a:solidFill>
-              </a:rPr>
-              <a:t/>
-            </a:r>
-            <a:br>
-              <a:rPr lang="it-IT" sz="2000" dirty="0" smtClean="0">
-                <a:solidFill>
-                  <a:srgbClr val="C00000"/>
-                </a:solidFill>
-              </a:rPr>
-            </a:br>
-            <a:r>
-              <a:rPr lang="it-IT" sz="2000" b="1" dirty="0" smtClean="0">
-                <a:solidFill>
-                  <a:srgbClr val="C00000"/>
-                </a:solidFill>
-                <a:latin typeface="Courier New" pitchFamily="49" charset="0"/>
-                <a:cs typeface="Courier New" pitchFamily="49" charset="0"/>
-              </a:rPr>
-              <a:t>lib-spq.xqy</a:t>
-            </a:r>
-            <a:r>
-              <a:rPr lang="it-IT" sz="2000" dirty="0" smtClean="0">
-                <a:solidFill>
-                  <a:srgbClr val="C00000"/>
-                </a:solidFill>
-              </a:rPr>
-              <a:t> </a:t>
-            </a:r>
-            <a:r>
-              <a:rPr lang="it-IT" sz="2000" dirty="0" smtClean="0"/>
-              <a:t>- SPARQL Protocol</a:t>
-            </a:r>
+            <a:endParaRPr lang="it-IT" sz="2000" dirty="0" smtClean="0"/>
           </a:p>
           <a:p>
             <a:pPr marL="1660525" lvl="4">
@@ -7067,8 +7415,8 @@
         </p:nvSpPr>
         <p:spPr>
           <a:xfrm>
-            <a:off x="1756611" y="1913060"/>
-            <a:ext cx="5642810" cy="4596064"/>
+            <a:off x="697832" y="1772816"/>
+            <a:ext cx="7772400" cy="1514599"/>
           </a:xfrm>
           <a:prstGeom prst="rect">
             <a:avLst/>
@@ -7085,7 +7433,7 @@
             </a:pPr>
             <a:r>
               <a:rPr lang="en-US" sz="3200" noProof="0" dirty="0" smtClean="0"/>
-              <a:t>A </a:t>
+              <a:t>But </a:t>
             </a:r>
             <a:r>
               <a:rPr lang="en-US" sz="3200" noProof="0" dirty="0" smtClean="0">
@@ -7093,7 +7441,7 @@
                   <a:srgbClr val="C00000"/>
                 </a:solidFill>
               </a:rPr>
-              <a:t>Wide</a:t>
+              <a:t>why</a:t>
             </a:r>
             <a:r>
               <a:rPr lang="en-US" sz="3200" noProof="0" dirty="0" smtClean="0"/>
@@ -7105,509 +7453,13 @@
                   <a:srgbClr val="C00000"/>
                 </a:solidFill>
               </a:rPr>
-              <a:t>Range</a:t>
+              <a:t>so many</a:t>
             </a:r>
             <a:r>
               <a:rPr lang="en-US" sz="3200" noProof="0" dirty="0" smtClean="0"/>
-              <a:t> of </a:t>
-            </a:r>
-            <a:r>
-              <a:rPr lang="en-US" sz="3200" noProof="0" dirty="0" smtClean="0"/>
-              <a:t>functions</a:t>
-            </a:r>
-            <a:endParaRPr lang="en-US" sz="3200" noProof="0" dirty="0" smtClean="0"/>
-          </a:p>
-          <a:p>
-            <a:pPr lvl="0" algn="ctr">
-              <a:spcBef>
-                <a:spcPct val="0"/>
-              </a:spcBef>
-            </a:pPr>
-            <a:endParaRPr lang="en-US" sz="1600" noProof="0" dirty="0" smtClean="0"/>
-          </a:p>
-          <a:p>
-            <a:pPr algn="ctr">
-              <a:spcBef>
-                <a:spcPct val="0"/>
-              </a:spcBef>
-            </a:pPr>
-            <a:r>
-              <a:rPr lang="en-GB" sz="1600" b="1" dirty="0" err="1" smtClean="0">
-                <a:solidFill>
-                  <a:schemeClr val="tx1">
-                    <a:lumMod val="60000"/>
-                    <a:lumOff val="40000"/>
-                  </a:schemeClr>
-                </a:solidFill>
-                <a:latin typeface="Courier New" pitchFamily="49" charset="0"/>
-                <a:cs typeface="Courier New" pitchFamily="49" charset="0"/>
-              </a:rPr>
-              <a:t>gsp:add</a:t>
-            </a:r>
-            <a:r>
-              <a:rPr lang="en-GB" sz="1600" b="1" dirty="0" smtClean="0">
-                <a:solidFill>
-                  <a:schemeClr val="tx1">
-                    <a:lumMod val="60000"/>
-                    <a:lumOff val="40000"/>
-                  </a:schemeClr>
-                </a:solidFill>
-                <a:latin typeface="Courier New" pitchFamily="49" charset="0"/>
-                <a:cs typeface="Courier New" pitchFamily="49" charset="0"/>
-              </a:rPr>
-              <a:t>-default-graph, </a:t>
-            </a:r>
-            <a:r>
-              <a:rPr lang="en-GB" sz="1600" b="1" dirty="0" err="1" smtClean="0">
-                <a:solidFill>
-                  <a:schemeClr val="tx1">
-                    <a:lumMod val="60000"/>
-                    <a:lumOff val="40000"/>
-                  </a:schemeClr>
-                </a:solidFill>
-                <a:latin typeface="Courier New" pitchFamily="49" charset="0"/>
-                <a:cs typeface="Courier New" pitchFamily="49" charset="0"/>
-              </a:rPr>
-              <a:t>gsp:add</a:t>
-            </a:r>
-            <a:r>
-              <a:rPr lang="en-GB" sz="1600" b="1" dirty="0" smtClean="0">
-                <a:solidFill>
-                  <a:schemeClr val="tx1">
-                    <a:lumMod val="60000"/>
-                    <a:lumOff val="40000"/>
-                  </a:schemeClr>
-                </a:solidFill>
-                <a:latin typeface="Courier New" pitchFamily="49" charset="0"/>
-                <a:cs typeface="Courier New" pitchFamily="49" charset="0"/>
-              </a:rPr>
-              <a:t>-named-graph, </a:t>
-            </a:r>
-            <a:r>
-              <a:rPr lang="en-GB" sz="1600" b="1" dirty="0" err="1" smtClean="0">
-                <a:solidFill>
-                  <a:schemeClr val="tx1">
-                    <a:lumMod val="60000"/>
-                    <a:lumOff val="40000"/>
-                  </a:schemeClr>
-                </a:solidFill>
-                <a:latin typeface="Courier New" pitchFamily="49" charset="0"/>
-                <a:cs typeface="Courier New" pitchFamily="49" charset="0"/>
-              </a:rPr>
-              <a:t>gsp:retrieve</a:t>
-            </a:r>
-            <a:r>
-              <a:rPr lang="en-GB" sz="1600" b="1" dirty="0" smtClean="0">
-                <a:solidFill>
-                  <a:schemeClr val="tx1">
-                    <a:lumMod val="60000"/>
-                    <a:lumOff val="40000"/>
-                  </a:schemeClr>
-                </a:solidFill>
-                <a:latin typeface="Courier New" pitchFamily="49" charset="0"/>
-                <a:cs typeface="Courier New" pitchFamily="49" charset="0"/>
-              </a:rPr>
-              <a:t>-default-graph-</a:t>
-            </a:r>
-            <a:r>
-              <a:rPr lang="en-GB" sz="1600" b="1" dirty="0" err="1" smtClean="0">
-                <a:solidFill>
-                  <a:schemeClr val="tx1">
-                    <a:lumMod val="60000"/>
-                    <a:lumOff val="40000"/>
-                  </a:schemeClr>
-                </a:solidFill>
-                <a:latin typeface="Courier New" pitchFamily="49" charset="0"/>
-                <a:cs typeface="Courier New" pitchFamily="49" charset="0"/>
-              </a:rPr>
-              <a:t>metainfo</a:t>
-            </a:r>
-            <a:r>
-              <a:rPr lang="en-GB" sz="1600" b="1" dirty="0" smtClean="0">
-                <a:solidFill>
-                  <a:schemeClr val="tx1">
-                    <a:lumMod val="60000"/>
-                    <a:lumOff val="40000"/>
-                  </a:schemeClr>
-                </a:solidFill>
-                <a:latin typeface="Courier New" pitchFamily="49" charset="0"/>
-                <a:cs typeface="Courier New" pitchFamily="49" charset="0"/>
-              </a:rPr>
-              <a:t>, </a:t>
-            </a:r>
-            <a:r>
-              <a:rPr lang="en-GB" sz="1600" b="1" dirty="0" err="1" smtClean="0">
-                <a:solidFill>
-                  <a:schemeClr val="tx1">
-                    <a:lumMod val="60000"/>
-                    <a:lumOff val="40000"/>
-                  </a:schemeClr>
-                </a:solidFill>
-                <a:latin typeface="Courier New" pitchFamily="49" charset="0"/>
-                <a:cs typeface="Courier New" pitchFamily="49" charset="0"/>
-              </a:rPr>
-              <a:t>gsp:retrieve</a:t>
-            </a:r>
-            <a:r>
-              <a:rPr lang="en-GB" sz="1600" b="1" dirty="0" smtClean="0">
-                <a:solidFill>
-                  <a:schemeClr val="tx1">
-                    <a:lumMod val="60000"/>
-                    <a:lumOff val="40000"/>
-                  </a:schemeClr>
-                </a:solidFill>
-                <a:latin typeface="Courier New" pitchFamily="49" charset="0"/>
-                <a:cs typeface="Courier New" pitchFamily="49" charset="0"/>
-              </a:rPr>
-              <a:t>-named-graph-</a:t>
-            </a:r>
-            <a:r>
-              <a:rPr lang="en-GB" sz="1600" b="1" dirty="0" err="1" smtClean="0">
-                <a:solidFill>
-                  <a:schemeClr val="tx1">
-                    <a:lumMod val="60000"/>
-                    <a:lumOff val="40000"/>
-                  </a:schemeClr>
-                </a:solidFill>
-                <a:latin typeface="Courier New" pitchFamily="49" charset="0"/>
-                <a:cs typeface="Courier New" pitchFamily="49" charset="0"/>
-              </a:rPr>
-              <a:t>metainfo</a:t>
-            </a:r>
-            <a:r>
-              <a:rPr lang="en-GB" sz="1600" b="1" dirty="0" smtClean="0">
-                <a:solidFill>
-                  <a:schemeClr val="tx1">
-                    <a:lumMod val="60000"/>
-                    <a:lumOff val="40000"/>
-                  </a:schemeClr>
-                </a:solidFill>
-                <a:latin typeface="Courier New" pitchFamily="49" charset="0"/>
-                <a:cs typeface="Courier New" pitchFamily="49" charset="0"/>
-              </a:rPr>
-              <a:t>, </a:t>
-            </a:r>
-          </a:p>
-          <a:p>
-            <a:pPr algn="ctr">
-              <a:spcBef>
-                <a:spcPct val="0"/>
-              </a:spcBef>
-            </a:pPr>
-            <a:r>
-              <a:rPr lang="en-GB" sz="1600" b="1" dirty="0" err="1" smtClean="0">
-                <a:solidFill>
-                  <a:schemeClr val="tx1">
-                    <a:lumMod val="60000"/>
-                    <a:lumOff val="40000"/>
-                  </a:schemeClr>
-                </a:solidFill>
-                <a:latin typeface="Courier New" pitchFamily="49" charset="0"/>
-                <a:cs typeface="Courier New" pitchFamily="49" charset="0"/>
-              </a:rPr>
-              <a:t>gsp:retrieve</a:t>
-            </a:r>
-            <a:r>
-              <a:rPr lang="en-GB" sz="1600" b="1" dirty="0" smtClean="0">
-                <a:solidFill>
-                  <a:schemeClr val="tx1">
-                    <a:lumMod val="60000"/>
-                    <a:lumOff val="40000"/>
-                  </a:schemeClr>
-                </a:solidFill>
-                <a:latin typeface="Courier New" pitchFamily="49" charset="0"/>
-                <a:cs typeface="Courier New" pitchFamily="49" charset="0"/>
-              </a:rPr>
-              <a:t>-default-graph, </a:t>
-            </a:r>
-          </a:p>
-          <a:p>
-            <a:pPr algn="ctr">
-              <a:spcBef>
-                <a:spcPct val="0"/>
-              </a:spcBef>
-            </a:pPr>
-            <a:r>
-              <a:rPr lang="en-GB" sz="1600" b="1" dirty="0" err="1" smtClean="0">
-                <a:solidFill>
-                  <a:schemeClr val="tx1">
-                    <a:lumMod val="60000"/>
-                    <a:lumOff val="40000"/>
-                  </a:schemeClr>
-                </a:solidFill>
-                <a:latin typeface="Courier New" pitchFamily="49" charset="0"/>
-                <a:cs typeface="Courier New" pitchFamily="49" charset="0"/>
-              </a:rPr>
-              <a:t>gsp:retrieve</a:t>
-            </a:r>
-            <a:r>
-              <a:rPr lang="en-GB" sz="1600" b="1" dirty="0" smtClean="0">
-                <a:solidFill>
-                  <a:schemeClr val="tx1">
-                    <a:lumMod val="60000"/>
-                    <a:lumOff val="40000"/>
-                  </a:schemeClr>
-                </a:solidFill>
-                <a:latin typeface="Courier New" pitchFamily="49" charset="0"/>
-                <a:cs typeface="Courier New" pitchFamily="49" charset="0"/>
-              </a:rPr>
-              <a:t>-named-graph, </a:t>
-            </a:r>
-          </a:p>
-          <a:p>
-            <a:pPr algn="ctr">
-              <a:spcBef>
-                <a:spcPct val="0"/>
-              </a:spcBef>
-            </a:pPr>
-            <a:r>
-              <a:rPr lang="en-GB" sz="1600" b="1" dirty="0" err="1" smtClean="0">
-                <a:solidFill>
-                  <a:schemeClr val="tx1">
-                    <a:lumMod val="60000"/>
-                    <a:lumOff val="40000"/>
-                  </a:schemeClr>
-                </a:solidFill>
-                <a:latin typeface="Courier New" pitchFamily="49" charset="0"/>
-                <a:cs typeface="Courier New" pitchFamily="49" charset="0"/>
-              </a:rPr>
-              <a:t>gsp:merge</a:t>
-            </a:r>
-            <a:r>
-              <a:rPr lang="en-GB" sz="1600" b="1" dirty="0" smtClean="0">
-                <a:solidFill>
-                  <a:schemeClr val="tx1">
-                    <a:lumMod val="60000"/>
-                    <a:lumOff val="40000"/>
-                  </a:schemeClr>
-                </a:solidFill>
-                <a:latin typeface="Courier New" pitchFamily="49" charset="0"/>
-                <a:cs typeface="Courier New" pitchFamily="49" charset="0"/>
-              </a:rPr>
-              <a:t>-default-graph, </a:t>
-            </a:r>
-          </a:p>
-          <a:p>
-            <a:pPr algn="ctr">
-              <a:spcBef>
-                <a:spcPct val="0"/>
-              </a:spcBef>
-            </a:pPr>
-            <a:r>
-              <a:rPr lang="en-GB" sz="1600" b="1" dirty="0" err="1" smtClean="0">
-                <a:solidFill>
-                  <a:schemeClr val="tx1">
-                    <a:lumMod val="60000"/>
-                    <a:lumOff val="40000"/>
-                  </a:schemeClr>
-                </a:solidFill>
-                <a:latin typeface="Courier New" pitchFamily="49" charset="0"/>
-                <a:cs typeface="Courier New" pitchFamily="49" charset="0"/>
-              </a:rPr>
-              <a:t>gsp:merge</a:t>
-            </a:r>
-            <a:r>
-              <a:rPr lang="en-GB" sz="1600" b="1" dirty="0" smtClean="0">
-                <a:solidFill>
-                  <a:schemeClr val="tx1">
-                    <a:lumMod val="60000"/>
-                    <a:lumOff val="40000"/>
-                  </a:schemeClr>
-                </a:solidFill>
-                <a:latin typeface="Courier New" pitchFamily="49" charset="0"/>
-                <a:cs typeface="Courier New" pitchFamily="49" charset="0"/>
-              </a:rPr>
-              <a:t>-named-graph, </a:t>
-            </a:r>
-          </a:p>
-          <a:p>
-            <a:pPr algn="ctr">
-              <a:spcBef>
-                <a:spcPct val="0"/>
-              </a:spcBef>
-            </a:pPr>
-            <a:r>
-              <a:rPr lang="en-GB" sz="1600" b="1" dirty="0" err="1" smtClean="0">
-                <a:solidFill>
-                  <a:schemeClr val="tx1">
-                    <a:lumMod val="60000"/>
-                    <a:lumOff val="40000"/>
-                  </a:schemeClr>
-                </a:solidFill>
-                <a:latin typeface="Courier New" pitchFamily="49" charset="0"/>
-                <a:cs typeface="Courier New" pitchFamily="49" charset="0"/>
-              </a:rPr>
-              <a:t>gsp:delete</a:t>
-            </a:r>
-            <a:r>
-              <a:rPr lang="en-GB" sz="1600" b="1" dirty="0" smtClean="0">
-                <a:solidFill>
-                  <a:schemeClr val="tx1">
-                    <a:lumMod val="60000"/>
-                    <a:lumOff val="40000"/>
-                  </a:schemeClr>
-                </a:solidFill>
-                <a:latin typeface="Courier New" pitchFamily="49" charset="0"/>
-                <a:cs typeface="Courier New" pitchFamily="49" charset="0"/>
-              </a:rPr>
-              <a:t>-default-graph, </a:t>
-            </a:r>
-          </a:p>
-          <a:p>
-            <a:pPr algn="ctr">
-              <a:spcBef>
-                <a:spcPct val="0"/>
-              </a:spcBef>
-            </a:pPr>
-            <a:r>
-              <a:rPr lang="en-GB" sz="1600" b="1" dirty="0" err="1" smtClean="0">
-                <a:solidFill>
-                  <a:schemeClr val="tx1">
-                    <a:lumMod val="60000"/>
-                    <a:lumOff val="40000"/>
-                  </a:schemeClr>
-                </a:solidFill>
-                <a:latin typeface="Courier New" pitchFamily="49" charset="0"/>
-                <a:cs typeface="Courier New" pitchFamily="49" charset="0"/>
-              </a:rPr>
-              <a:t>gsp:delete</a:t>
-            </a:r>
-            <a:r>
-              <a:rPr lang="en-GB" sz="1600" b="1" dirty="0" smtClean="0">
-                <a:solidFill>
-                  <a:schemeClr val="tx1">
-                    <a:lumMod val="60000"/>
-                    <a:lumOff val="40000"/>
-                  </a:schemeClr>
-                </a:solidFill>
-                <a:latin typeface="Courier New" pitchFamily="49" charset="0"/>
-                <a:cs typeface="Courier New" pitchFamily="49" charset="0"/>
-              </a:rPr>
-              <a:t>-named-graph, </a:t>
-            </a:r>
-            <a:r>
-              <a:rPr lang="en-GB" sz="1600" b="1" dirty="0" err="1" smtClean="0">
-                <a:solidFill>
-                  <a:schemeClr val="tx1">
-                    <a:lumMod val="60000"/>
-                    <a:lumOff val="40000"/>
-                  </a:schemeClr>
-                </a:solidFill>
-                <a:latin typeface="Courier New" pitchFamily="49" charset="0"/>
-                <a:cs typeface="Courier New" pitchFamily="49" charset="0"/>
-              </a:rPr>
-              <a:t>gsp:data</a:t>
-            </a:r>
-            <a:r>
-              <a:rPr lang="en-GB" sz="1600" b="1" dirty="0" smtClean="0">
-                <a:solidFill>
-                  <a:schemeClr val="tx1">
-                    <a:lumMod val="60000"/>
-                    <a:lumOff val="40000"/>
-                  </a:schemeClr>
-                </a:solidFill>
-                <a:latin typeface="Courier New" pitchFamily="49" charset="0"/>
-                <a:cs typeface="Courier New" pitchFamily="49" charset="0"/>
-              </a:rPr>
-              <a:t>, </a:t>
-            </a:r>
-          </a:p>
-          <a:p>
-            <a:pPr algn="ctr">
-              <a:spcBef>
-                <a:spcPct val="0"/>
-              </a:spcBef>
-            </a:pPr>
-            <a:r>
-              <a:rPr lang="en-GB" sz="1600" b="1" dirty="0" err="1" smtClean="0">
-                <a:solidFill>
-                  <a:schemeClr val="tx1">
-                    <a:lumMod val="60000"/>
-                    <a:lumOff val="40000"/>
-                  </a:schemeClr>
-                </a:solidFill>
-                <a:latin typeface="Courier New" pitchFamily="49" charset="0"/>
-                <a:cs typeface="Courier New" pitchFamily="49" charset="0"/>
-              </a:rPr>
-              <a:t>spq:query</a:t>
-            </a:r>
-            <a:r>
-              <a:rPr lang="en-GB" sz="1600" b="1" dirty="0" smtClean="0">
-                <a:solidFill>
-                  <a:schemeClr val="tx1">
-                    <a:lumMod val="60000"/>
-                    <a:lumOff val="40000"/>
-                  </a:schemeClr>
-                </a:solidFill>
-                <a:latin typeface="Courier New" pitchFamily="49" charset="0"/>
-                <a:cs typeface="Courier New" pitchFamily="49" charset="0"/>
-              </a:rPr>
-              <a:t>, </a:t>
-            </a:r>
-            <a:r>
-              <a:rPr lang="en-GB" sz="1600" b="1" dirty="0" err="1" smtClean="0">
-                <a:solidFill>
-                  <a:schemeClr val="tx1">
-                    <a:lumMod val="60000"/>
-                    <a:lumOff val="40000"/>
-                  </a:schemeClr>
-                </a:solidFill>
-                <a:latin typeface="Courier New" pitchFamily="49" charset="0"/>
-                <a:cs typeface="Courier New" pitchFamily="49" charset="0"/>
-              </a:rPr>
-              <a:t>spq:data</a:t>
-            </a:r>
-            <a:endParaRPr lang="en-GB" sz="1600" b="1" dirty="0" smtClean="0">
-              <a:solidFill>
-                <a:schemeClr val="tx1">
-                  <a:lumMod val="60000"/>
-                  <a:lumOff val="40000"/>
-                </a:schemeClr>
-              </a:solidFill>
-              <a:latin typeface="Courier New" pitchFamily="49" charset="0"/>
-              <a:cs typeface="Courier New" pitchFamily="49" charset="0"/>
-            </a:endParaRPr>
-          </a:p>
-          <a:p>
-            <a:pPr lvl="4">
-              <a:spcBef>
-                <a:spcPct val="0"/>
-              </a:spcBef>
-            </a:pPr>
-            <a:endParaRPr lang="en-US" sz="1600" b="1" noProof="0" dirty="0" smtClean="0">
-              <a:solidFill>
-                <a:schemeClr val="tx1">
-                  <a:lumMod val="60000"/>
-                  <a:lumOff val="40000"/>
-                </a:schemeClr>
-              </a:solidFill>
-              <a:latin typeface="Courier New" pitchFamily="49" charset="0"/>
-              <a:cs typeface="Courier New" pitchFamily="49" charset="0"/>
-            </a:endParaRPr>
-          </a:p>
-          <a:p>
-            <a:pPr marL="288925" lvl="1">
-              <a:spcBef>
-                <a:spcPct val="0"/>
-              </a:spcBef>
-            </a:pPr>
-            <a:endParaRPr lang="it-IT" sz="2000" dirty="0" smtClean="0"/>
-          </a:p>
-          <a:p>
-            <a:pPr marL="1660525" lvl="4">
-              <a:spcBef>
-                <a:spcPct val="0"/>
-              </a:spcBef>
-            </a:pPr>
-            <a:endParaRPr lang="it-IT" sz="2000" dirty="0" smtClean="0"/>
-          </a:p>
-          <a:p>
-            <a:pPr marL="1660525" lvl="4">
-              <a:spcBef>
-                <a:spcPct val="0"/>
-              </a:spcBef>
-            </a:pPr>
-            <a:endParaRPr kumimoji="0" lang="en-GB" sz="2000" i="0" u="none" strike="noStrike" kern="1200" cap="none" spc="0" normalizeH="0" baseline="0" noProof="0" dirty="0">
+              <a:t> functions?</a:t>
+            </a:r>
+            <a:endParaRPr kumimoji="0" lang="en-GB" sz="3200" i="0" u="none" strike="noStrike" kern="1200" cap="none" spc="0" normalizeH="0" baseline="0" noProof="0" dirty="0">
               <a:ln>
                 <a:noFill/>
               </a:ln>
@@ -7701,11 +7553,7 @@
             </a:r>
             <a:r>
               <a:rPr lang="en-US" sz="3200" dirty="0" smtClean="0"/>
-              <a:t> </a:t>
-            </a:r>
-            <a:r>
-              <a:rPr lang="en-US" sz="3200" dirty="0" smtClean="0"/>
-              <a:t>big news</a:t>
+              <a:t> big news</a:t>
             </a:r>
             <a:endParaRPr kumimoji="0" lang="en-GB" sz="3200" i="0" u="none" strike="noStrike" kern="1200" cap="none" spc="0" normalizeH="0" baseline="0" noProof="0" dirty="0">
               <a:ln>
@@ -7745,118 +7593,6 @@
 </file>
 
 <file path=ppt/slides/slide20.xml><?xml version="1.0" encoding="utf-8"?>
-<p:sld xmlns:a="http://schemas.openxmlformats.org/drawingml/2006/main" xmlns:r="http://schemas.openxmlformats.org/officeDocument/2006/relationships" xmlns:p="http://schemas.openxmlformats.org/presentationml/2006/main">
-  <p:cSld>
-    <p:spTree>
-      <p:nvGrpSpPr>
-        <p:cNvPr id="1" name=""/>
-        <p:cNvGrpSpPr/>
-        <p:nvPr/>
-      </p:nvGrpSpPr>
-      <p:grpSpPr>
-        <a:xfrm>
-          <a:off x="0" y="0"/>
-          <a:ext cx="0" cy="0"/>
-          <a:chOff x="0" y="0"/>
-          <a:chExt cx="0" cy="0"/>
-        </a:xfrm>
-      </p:grpSpPr>
-      <p:sp>
-        <p:nvSpPr>
-          <p:cNvPr id="4" name="Title 1"/>
-          <p:cNvSpPr txBox="1">
-            <a:spLocks/>
-          </p:cNvSpPr>
-          <p:nvPr/>
-        </p:nvSpPr>
-        <p:spPr>
-          <a:xfrm>
-            <a:off x="697832" y="1772816"/>
-            <a:ext cx="7772400" cy="1514599"/>
-          </a:xfrm>
-          <a:prstGeom prst="rect">
-            <a:avLst/>
-          </a:prstGeom>
-        </p:spPr>
-        <p:txBody>
-          <a:bodyPr anchor="ctr"/>
-          <a:lstStyle/>
-          <a:p>
-            <a:pPr lvl="0" algn="ctr">
-              <a:spcBef>
-                <a:spcPct val="0"/>
-              </a:spcBef>
-            </a:pPr>
-            <a:r>
-              <a:rPr lang="en-US" sz="3200" noProof="0" dirty="0" smtClean="0"/>
-              <a:t>But</a:t>
-            </a:r>
-            <a:r>
-              <a:rPr lang="en-US" sz="3200" noProof="0" dirty="0" smtClean="0"/>
-              <a:t> </a:t>
-            </a:r>
-            <a:r>
-              <a:rPr lang="en-US" sz="3200" noProof="0" dirty="0" smtClean="0">
-                <a:solidFill>
-                  <a:srgbClr val="C00000"/>
-                </a:solidFill>
-              </a:rPr>
-              <a:t>why</a:t>
-            </a:r>
-            <a:r>
-              <a:rPr lang="en-US" sz="3200" noProof="0" dirty="0" smtClean="0"/>
-              <a:t> </a:t>
-            </a:r>
-            <a:r>
-              <a:rPr lang="en-US" sz="3200" noProof="0" dirty="0" smtClean="0">
-                <a:solidFill>
-                  <a:srgbClr val="C00000"/>
-                </a:solidFill>
-              </a:rPr>
-              <a:t>so many</a:t>
-            </a:r>
-            <a:r>
-              <a:rPr lang="en-US" sz="3200" noProof="0" dirty="0" smtClean="0"/>
-              <a:t> functions?</a:t>
-            </a:r>
-            <a:endParaRPr kumimoji="0" lang="en-GB" sz="3200" i="0" u="none" strike="noStrike" kern="1200" cap="none" spc="0" normalizeH="0" baseline="0" noProof="0" dirty="0">
-              <a:ln>
-                <a:noFill/>
-              </a:ln>
-              <a:solidFill>
-                <a:schemeClr val="tx1">
-                  <a:lumMod val="50000"/>
-                </a:schemeClr>
-              </a:solidFill>
-              <a:effectLst/>
-              <a:uLnTx/>
-              <a:uFillTx/>
-              <a:latin typeface="Tahoma" pitchFamily="34" charset="0"/>
-              <a:ea typeface="Tahoma" pitchFamily="34" charset="0"/>
-              <a:cs typeface="Tahoma" pitchFamily="34" charset="0"/>
-            </a:endParaRPr>
-          </a:p>
-        </p:txBody>
-      </p:sp>
-    </p:spTree>
-  </p:cSld>
-  <p:clrMapOvr>
-    <a:masterClrMapping/>
-  </p:clrMapOvr>
-  <p:transition>
-    <p:fade/>
-  </p:transition>
-  <p:timing>
-    <p:tnLst>
-      <p:par>
-        <p:cTn id="1" dur="indefinite" restart="never" nodeType="tmRoot"/>
-      </p:par>
-    </p:tnLst>
-  </p:timing>
-</p:sld>
-</file>
-
-<file path=ppt/slides/slide21.xml><?xml version="1.0" encoding="utf-8"?>
 <p:sld xmlns:a="http://schemas.openxmlformats.org/drawingml/2006/main" xmlns:r="http://schemas.openxmlformats.org/officeDocument/2006/relationships" xmlns:p="http://schemas.openxmlformats.org/presentationml/2006/main">
   <p:cSld>
     <p:spTree>
@@ -8017,6 +7753,388 @@
 </p:sld>
 </file>
 
+<file path=ppt/slides/slide21.xml><?xml version="1.0" encoding="utf-8"?>
+<p:sld xmlns:a="http://schemas.openxmlformats.org/drawingml/2006/main" xmlns:r="http://schemas.openxmlformats.org/officeDocument/2006/relationships" xmlns:p="http://schemas.openxmlformats.org/presentationml/2006/main">
+  <p:cSld>
+    <p:spTree>
+      <p:nvGrpSpPr>
+        <p:cNvPr id="1" name=""/>
+        <p:cNvGrpSpPr/>
+        <p:nvPr/>
+      </p:nvGrpSpPr>
+      <p:grpSpPr>
+        <a:xfrm>
+          <a:off x="0" y="0"/>
+          <a:ext cx="0" cy="0"/>
+          <a:chOff x="0" y="0"/>
+          <a:chExt cx="0" cy="0"/>
+        </a:xfrm>
+      </p:grpSpPr>
+      <p:sp>
+        <p:nvSpPr>
+          <p:cNvPr id="4" name="Title 1"/>
+          <p:cNvSpPr txBox="1">
+            <a:spLocks/>
+          </p:cNvSpPr>
+          <p:nvPr/>
+        </p:nvSpPr>
+        <p:spPr>
+          <a:xfrm>
+            <a:off x="541422" y="1434494"/>
+            <a:ext cx="8061158" cy="3895475"/>
+          </a:xfrm>
+          <a:prstGeom prst="rect">
+            <a:avLst/>
+          </a:prstGeom>
+        </p:spPr>
+        <p:txBody>
+          <a:bodyPr anchor="ctr"/>
+          <a:lstStyle/>
+          <a:p>
+            <a:pPr lvl="0" algn="ctr">
+              <a:spcBef>
+                <a:spcPct val="0"/>
+              </a:spcBef>
+            </a:pPr>
+            <a:r>
+              <a:rPr kumimoji="0" lang="en-US" sz="3200" i="0" u="none" strike="noStrike" kern="1200" cap="none" spc="0" normalizeH="0" baseline="0" noProof="0" dirty="0" smtClean="0">
+                <a:ln>
+                  <a:noFill/>
+                </a:ln>
+                <a:solidFill>
+                  <a:schemeClr val="tx1">
+                    <a:lumMod val="50000"/>
+                  </a:schemeClr>
+                </a:solidFill>
+                <a:effectLst/>
+                <a:uLnTx/>
+                <a:uFillTx/>
+                <a:latin typeface="Tahoma" pitchFamily="34" charset="0"/>
+                <a:ea typeface="Tahoma" pitchFamily="34" charset="0"/>
+                <a:cs typeface="Tahoma" pitchFamily="34" charset="0"/>
+              </a:rPr>
+              <a:t>I don’t like </a:t>
+            </a:r>
+            <a:r>
+              <a:rPr kumimoji="0" lang="en-US" sz="3200" i="0" u="none" strike="noStrike" kern="1200" cap="none" spc="0" normalizeH="0" baseline="0" noProof="0" dirty="0" smtClean="0">
+                <a:ln>
+                  <a:noFill/>
+                </a:ln>
+                <a:solidFill>
+                  <a:srgbClr val="C00000"/>
+                </a:solidFill>
+                <a:effectLst/>
+                <a:uLnTx/>
+                <a:uFillTx/>
+                <a:latin typeface="Tahoma" pitchFamily="34" charset="0"/>
+                <a:ea typeface="Tahoma" pitchFamily="34" charset="0"/>
+                <a:cs typeface="Tahoma" pitchFamily="34" charset="0"/>
+              </a:rPr>
+              <a:t>optional</a:t>
+            </a:r>
+            <a:r>
+              <a:rPr kumimoji="0" lang="en-US" sz="3200" i="0" u="none" strike="noStrike" kern="1200" cap="none" spc="0" normalizeH="0" baseline="0" noProof="0" dirty="0" smtClean="0">
+                <a:ln>
+                  <a:noFill/>
+                </a:ln>
+                <a:solidFill>
+                  <a:schemeClr val="tx1">
+                    <a:lumMod val="50000"/>
+                  </a:schemeClr>
+                </a:solidFill>
+                <a:effectLst/>
+                <a:uLnTx/>
+                <a:uFillTx/>
+                <a:latin typeface="Tahoma" pitchFamily="34" charset="0"/>
+                <a:ea typeface="Tahoma" pitchFamily="34" charset="0"/>
+                <a:cs typeface="Tahoma" pitchFamily="34" charset="0"/>
+              </a:rPr>
+              <a:t> arguments!</a:t>
+            </a:r>
+          </a:p>
+          <a:p>
+            <a:pPr lvl="1">
+              <a:spcBef>
+                <a:spcPct val="0"/>
+              </a:spcBef>
+            </a:pPr>
+            <a:endParaRPr lang="en-GB" sz="1600" b="1" dirty="0" smtClean="0">
+              <a:solidFill>
+                <a:schemeClr val="tx1">
+                  <a:lumMod val="60000"/>
+                  <a:lumOff val="40000"/>
+                </a:schemeClr>
+              </a:solidFill>
+              <a:latin typeface="Courier New" pitchFamily="49" charset="0"/>
+              <a:cs typeface="Courier New" pitchFamily="49" charset="0"/>
+            </a:endParaRPr>
+          </a:p>
+          <a:p>
+            <a:pPr marL="2117725" lvl="3">
+              <a:spcBef>
+                <a:spcPct val="0"/>
+              </a:spcBef>
+            </a:pPr>
+            <a:r>
+              <a:rPr lang="en-GB" sz="1600" b="1" dirty="0" err="1" smtClean="0">
+                <a:solidFill>
+                  <a:schemeClr val="tx1">
+                    <a:lumMod val="60000"/>
+                    <a:lumOff val="40000"/>
+                  </a:schemeClr>
+                </a:solidFill>
+                <a:latin typeface="Courier New" pitchFamily="49" charset="0"/>
+                <a:cs typeface="Courier New" pitchFamily="49" charset="0"/>
+              </a:rPr>
+              <a:t>xdmp:document</a:t>
+            </a:r>
+            <a:r>
+              <a:rPr lang="en-GB" sz="1600" b="1" dirty="0" smtClean="0">
+                <a:solidFill>
+                  <a:schemeClr val="tx1">
+                    <a:lumMod val="60000"/>
+                    <a:lumOff val="40000"/>
+                  </a:schemeClr>
+                </a:solidFill>
+                <a:latin typeface="Courier New" pitchFamily="49" charset="0"/>
+                <a:cs typeface="Courier New" pitchFamily="49" charset="0"/>
+              </a:rPr>
+              <a:t>-insert(</a:t>
+            </a:r>
+          </a:p>
+          <a:p>
+            <a:pPr marL="2574925" lvl="7">
+              <a:spcBef>
+                <a:spcPct val="0"/>
+              </a:spcBef>
+            </a:pPr>
+            <a:r>
+              <a:rPr lang="en-GB" sz="1600" b="1" dirty="0" smtClean="0">
+                <a:solidFill>
+                  <a:schemeClr val="tx1">
+                    <a:lumMod val="60000"/>
+                    <a:lumOff val="40000"/>
+                  </a:schemeClr>
+                </a:solidFill>
+                <a:latin typeface="Courier New" pitchFamily="49" charset="0"/>
+                <a:cs typeface="Courier New" pitchFamily="49" charset="0"/>
+              </a:rPr>
+              <a:t>'/books/collection/A123.xml',</a:t>
+            </a:r>
+          </a:p>
+          <a:p>
+            <a:pPr marL="2574925" lvl="7">
+              <a:spcBef>
+                <a:spcPct val="0"/>
+              </a:spcBef>
+            </a:pPr>
+            <a:r>
+              <a:rPr lang="en-GB" sz="1600" b="1" dirty="0" smtClean="0">
+                <a:solidFill>
+                  <a:schemeClr val="tx1">
+                    <a:lumMod val="60000"/>
+                    <a:lumOff val="40000"/>
+                  </a:schemeClr>
+                </a:solidFill>
+                <a:latin typeface="Courier New" pitchFamily="49" charset="0"/>
+                <a:cs typeface="Courier New" pitchFamily="49" charset="0"/>
+              </a:rPr>
+              <a:t>&lt;book&gt;</a:t>
+            </a:r>
+          </a:p>
+          <a:p>
+            <a:pPr marL="2574925" lvl="7">
+              <a:spcBef>
+                <a:spcPct val="0"/>
+              </a:spcBef>
+            </a:pPr>
+            <a:r>
+              <a:rPr lang="en-GB" sz="1600" b="1" dirty="0" smtClean="0">
+                <a:solidFill>
+                  <a:schemeClr val="tx1">
+                    <a:lumMod val="60000"/>
+                    <a:lumOff val="40000"/>
+                  </a:schemeClr>
+                </a:solidFill>
+                <a:latin typeface="Courier New" pitchFamily="49" charset="0"/>
+                <a:cs typeface="Courier New" pitchFamily="49" charset="0"/>
+              </a:rPr>
+              <a:t>  &lt;title&gt;Linked Data&lt;/title&gt;</a:t>
+            </a:r>
+          </a:p>
+          <a:p>
+            <a:pPr marL="2574925" lvl="7">
+              <a:spcBef>
+                <a:spcPct val="0"/>
+              </a:spcBef>
+            </a:pPr>
+            <a:r>
+              <a:rPr lang="en-GB" sz="1600" b="1" dirty="0" smtClean="0">
+                <a:solidFill>
+                  <a:schemeClr val="tx1">
+                    <a:lumMod val="60000"/>
+                    <a:lumOff val="40000"/>
+                  </a:schemeClr>
+                </a:solidFill>
+                <a:latin typeface="Courier New" pitchFamily="49" charset="0"/>
+                <a:cs typeface="Courier New" pitchFamily="49" charset="0"/>
+              </a:rPr>
+              <a:t>&lt;/book&gt;,</a:t>
+            </a:r>
+          </a:p>
+          <a:p>
+            <a:pPr marL="2574925" lvl="7">
+              <a:spcBef>
+                <a:spcPct val="0"/>
+              </a:spcBef>
+            </a:pPr>
+            <a:r>
+              <a:rPr lang="en-GB" sz="1600" b="1" dirty="0" smtClean="0">
+                <a:solidFill>
+                  <a:srgbClr val="C00000"/>
+                </a:solidFill>
+                <a:latin typeface="Courier New" pitchFamily="49" charset="0"/>
+                <a:cs typeface="Courier New" pitchFamily="49" charset="0"/>
+              </a:rPr>
+              <a:t>()</a:t>
+            </a:r>
+            <a:r>
+              <a:rPr lang="en-GB" sz="1600" b="1" dirty="0" smtClean="0">
+                <a:solidFill>
+                  <a:schemeClr val="tx1">
+                    <a:lumMod val="60000"/>
+                    <a:lumOff val="40000"/>
+                  </a:schemeClr>
+                </a:solidFill>
+                <a:latin typeface="Courier New" pitchFamily="49" charset="0"/>
+                <a:cs typeface="Courier New" pitchFamily="49" charset="0"/>
+              </a:rPr>
+              <a:t>, </a:t>
+            </a:r>
+            <a:r>
+              <a:rPr lang="en-GB" sz="1600" b="1" dirty="0" smtClean="0">
+                <a:solidFill>
+                  <a:srgbClr val="C00000"/>
+                </a:solidFill>
+                <a:latin typeface="Courier New" pitchFamily="49" charset="0"/>
+                <a:cs typeface="Courier New" pitchFamily="49" charset="0"/>
+              </a:rPr>
+              <a:t>()</a:t>
+            </a:r>
+            <a:r>
+              <a:rPr lang="en-GB" sz="1600" b="1" dirty="0" smtClean="0">
+                <a:solidFill>
+                  <a:schemeClr val="tx1">
+                    <a:lumMod val="60000"/>
+                    <a:lumOff val="40000"/>
+                  </a:schemeClr>
+                </a:solidFill>
+                <a:latin typeface="Courier New" pitchFamily="49" charset="0"/>
+                <a:cs typeface="Courier New" pitchFamily="49" charset="0"/>
+              </a:rPr>
+              <a:t>,</a:t>
+            </a:r>
+            <a:r>
+              <a:rPr lang="en-GB" sz="1600" b="1" dirty="0" smtClean="0">
+                <a:solidFill>
+                  <a:srgbClr val="C00000"/>
+                </a:solidFill>
+                <a:latin typeface="Courier New" pitchFamily="49" charset="0"/>
+                <a:cs typeface="Courier New" pitchFamily="49" charset="0"/>
+              </a:rPr>
+              <a:t> ()</a:t>
+            </a:r>
+            <a:r>
+              <a:rPr lang="en-GB" sz="1600" b="1" dirty="0" smtClean="0">
+                <a:solidFill>
+                  <a:schemeClr val="tx1">
+                    <a:lumMod val="60000"/>
+                    <a:lumOff val="40000"/>
+                  </a:schemeClr>
+                </a:solidFill>
+                <a:latin typeface="Courier New" pitchFamily="49" charset="0"/>
+                <a:cs typeface="Courier New" pitchFamily="49" charset="0"/>
+              </a:rPr>
+              <a:t>,</a:t>
+            </a:r>
+          </a:p>
+          <a:p>
+            <a:pPr marL="2574925" lvl="6">
+              <a:spcBef>
+                <a:spcPct val="0"/>
+              </a:spcBef>
+            </a:pPr>
+            <a:r>
+              <a:rPr lang="en-US" sz="1600" b="1" dirty="0" smtClean="0">
+                <a:solidFill>
+                  <a:schemeClr val="tx1">
+                    <a:lumMod val="60000"/>
+                    <a:lumOff val="40000"/>
+                  </a:schemeClr>
+                </a:solidFill>
+                <a:latin typeface="Courier New" pitchFamily="49" charset="0"/>
+                <a:cs typeface="Courier New" pitchFamily="49" charset="0"/>
+              </a:rPr>
+              <a:t>5780546120451828821</a:t>
+            </a:r>
+          </a:p>
+          <a:p>
+            <a:pPr marL="2117725" lvl="4">
+              <a:spcBef>
+                <a:spcPct val="0"/>
+              </a:spcBef>
+            </a:pPr>
+            <a:r>
+              <a:rPr lang="en-GB" sz="1600" b="1" dirty="0" smtClean="0">
+                <a:solidFill>
+                  <a:schemeClr val="tx1">
+                    <a:lumMod val="60000"/>
+                    <a:lumOff val="40000"/>
+                  </a:schemeClr>
+                </a:solidFill>
+                <a:latin typeface="Courier New" pitchFamily="49" charset="0"/>
+                <a:cs typeface="Courier New" pitchFamily="49" charset="0"/>
+              </a:rPr>
+              <a:t>)</a:t>
+            </a:r>
+            <a:endParaRPr kumimoji="0" lang="en-GB" sz="1600" b="1" i="0" u="none" strike="noStrike" kern="1200" cap="none" spc="0" normalizeH="0" baseline="0" noProof="0" dirty="0">
+              <a:ln>
+                <a:noFill/>
+              </a:ln>
+              <a:solidFill>
+                <a:schemeClr val="tx1">
+                  <a:lumMod val="60000"/>
+                  <a:lumOff val="40000"/>
+                </a:schemeClr>
+              </a:solidFill>
+              <a:effectLst/>
+              <a:uLnTx/>
+              <a:uFillTx/>
+              <a:latin typeface="Courier New" pitchFamily="49" charset="0"/>
+              <a:ea typeface="Tahoma" pitchFamily="34" charset="0"/>
+              <a:cs typeface="Courier New" pitchFamily="49" charset="0"/>
+            </a:endParaRPr>
+          </a:p>
+        </p:txBody>
+      </p:sp>
+    </p:spTree>
+  </p:cSld>
+  <p:clrMapOvr>
+    <a:masterClrMapping/>
+  </p:clrMapOvr>
+  <p:transition>
+    <p:fade/>
+  </p:transition>
+  <p:timing>
+    <p:tnLst>
+      <p:par>
+        <p:cTn id="1" dur="indefinite" restart="never" nodeType="tmRoot"/>
+      </p:par>
+    </p:tnLst>
+  </p:timing>
+</p:sld>
+</file>
+
 <file path=ppt/slides/slide22.xml><?xml version="1.0" encoding="utf-8"?>
 <p:sld xmlns:a="http://schemas.openxmlformats.org/drawingml/2006/main" xmlns:r="http://schemas.openxmlformats.org/officeDocument/2006/relationships" xmlns:p="http://schemas.openxmlformats.org/presentationml/2006/main">
   <p:cSld>
@@ -8044,8 +8162,8 @@
         </p:nvSpPr>
         <p:spPr>
           <a:xfrm>
-            <a:off x="541422" y="1434494"/>
-            <a:ext cx="8061158" cy="3895475"/>
+            <a:off x="697832" y="1772816"/>
+            <a:ext cx="7772400" cy="1514599"/>
           </a:xfrm>
           <a:prstGeom prst="rect">
             <a:avLst/>
@@ -8061,322 +8179,36 @@
               </a:spcBef>
             </a:pPr>
             <a:r>
-              <a:rPr kumimoji="0" lang="en-US" sz="3200" i="0" u="none" strike="noStrike" kern="1200" cap="none" spc="0" normalizeH="0" baseline="0" noProof="0" dirty="0" smtClean="0">
-                <a:ln>
-                  <a:noFill/>
-                </a:ln>
-                <a:solidFill>
-                  <a:schemeClr val="tx1">
-                    <a:lumMod val="50000"/>
-                  </a:schemeClr>
-                </a:solidFill>
-                <a:effectLst/>
-                <a:uLnTx/>
-                <a:uFillTx/>
-                <a:latin typeface="Tahoma" pitchFamily="34" charset="0"/>
-                <a:ea typeface="Tahoma" pitchFamily="34" charset="0"/>
-                <a:cs typeface="Tahoma" pitchFamily="34" charset="0"/>
-              </a:rPr>
-              <a:t>I don’t like </a:t>
-            </a:r>
-            <a:r>
-              <a:rPr kumimoji="0" lang="en-US" sz="3200" i="0" u="none" strike="noStrike" kern="1200" cap="none" spc="0" normalizeH="0" baseline="0" noProof="0" dirty="0" smtClean="0">
-                <a:ln>
-                  <a:noFill/>
-                </a:ln>
+              <a:rPr lang="en-US" sz="3200" dirty="0" smtClean="0"/>
+              <a:t>A </a:t>
+            </a:r>
+            <a:r>
+              <a:rPr lang="en-US" sz="3200" dirty="0" err="1" smtClean="0">
                 <a:solidFill>
                   <a:srgbClr val="C00000"/>
                 </a:solidFill>
-                <a:effectLst/>
-                <a:uLnTx/>
-                <a:uFillTx/>
-                <a:latin typeface="Tahoma" pitchFamily="34" charset="0"/>
-                <a:ea typeface="Tahoma" pitchFamily="34" charset="0"/>
-                <a:cs typeface="Tahoma" pitchFamily="34" charset="0"/>
-              </a:rPr>
-              <a:t>optional</a:t>
-            </a:r>
-            <a:r>
-              <a:rPr kumimoji="0" lang="en-US" sz="3200" i="0" u="none" strike="noStrike" kern="1200" cap="none" spc="0" normalizeH="0" baseline="0" noProof="0" dirty="0" smtClean="0">
-                <a:ln>
-                  <a:noFill/>
-                </a:ln>
-                <a:solidFill>
-                  <a:schemeClr val="tx1">
-                    <a:lumMod val="50000"/>
-                  </a:schemeClr>
-                </a:solidFill>
-                <a:effectLst/>
-                <a:uLnTx/>
-                <a:uFillTx/>
-                <a:latin typeface="Tahoma" pitchFamily="34" charset="0"/>
-                <a:ea typeface="Tahoma" pitchFamily="34" charset="0"/>
-                <a:cs typeface="Tahoma" pitchFamily="34" charset="0"/>
-              </a:rPr>
-              <a:t> arguments!</a:t>
-            </a:r>
-          </a:p>
-          <a:p>
-            <a:pPr lvl="1">
-              <a:spcBef>
-                <a:spcPct val="0"/>
-              </a:spcBef>
-            </a:pPr>
-            <a:endParaRPr lang="en-GB" sz="1600" b="1" dirty="0" smtClean="0">
-              <a:solidFill>
-                <a:schemeClr val="tx1">
-                  <a:lumMod val="60000"/>
-                  <a:lumOff val="40000"/>
-                </a:schemeClr>
-              </a:solidFill>
-              <a:latin typeface="Courier New" pitchFamily="49" charset="0"/>
-              <a:cs typeface="Courier New" pitchFamily="49" charset="0"/>
-            </a:endParaRPr>
-          </a:p>
-          <a:p>
-            <a:pPr marL="2117725" lvl="3">
-              <a:spcBef>
-                <a:spcPct val="0"/>
-              </a:spcBef>
-            </a:pPr>
-            <a:r>
-              <a:rPr lang="en-GB" sz="1600" b="1" dirty="0" err="1" smtClean="0">
-                <a:solidFill>
-                  <a:schemeClr val="tx1">
-                    <a:lumMod val="60000"/>
-                    <a:lumOff val="40000"/>
-                  </a:schemeClr>
-                </a:solidFill>
-                <a:latin typeface="Courier New" pitchFamily="49" charset="0"/>
-                <a:cs typeface="Courier New" pitchFamily="49" charset="0"/>
-              </a:rPr>
-              <a:t>xdmp:document</a:t>
-            </a:r>
-            <a:r>
-              <a:rPr lang="en-GB" sz="1600" b="1" dirty="0" smtClean="0">
-                <a:solidFill>
-                  <a:schemeClr val="tx1">
-                    <a:lumMod val="60000"/>
-                    <a:lumOff val="40000"/>
-                  </a:schemeClr>
-                </a:solidFill>
-                <a:latin typeface="Courier New" pitchFamily="49" charset="0"/>
-                <a:cs typeface="Courier New" pitchFamily="49" charset="0"/>
-              </a:rPr>
-              <a:t>-insert(</a:t>
-            </a:r>
-          </a:p>
-          <a:p>
-            <a:pPr marL="2574925" lvl="7">
-              <a:spcBef>
-                <a:spcPct val="0"/>
-              </a:spcBef>
-            </a:pPr>
-            <a:r>
-              <a:rPr lang="en-GB" sz="1600" b="1" dirty="0" smtClean="0">
-                <a:solidFill>
-                  <a:schemeClr val="tx1">
-                    <a:lumMod val="60000"/>
-                    <a:lumOff val="40000"/>
-                  </a:schemeClr>
-                </a:solidFill>
-                <a:latin typeface="Courier New" pitchFamily="49" charset="0"/>
-                <a:cs typeface="Courier New" pitchFamily="49" charset="0"/>
-              </a:rPr>
-              <a:t>'/books/collection/A123.xml',</a:t>
-            </a:r>
-          </a:p>
-          <a:p>
-            <a:pPr marL="2574925" lvl="7">
-              <a:spcBef>
-                <a:spcPct val="0"/>
-              </a:spcBef>
-            </a:pPr>
-            <a:r>
-              <a:rPr lang="en-GB" sz="1600" b="1" dirty="0" smtClean="0">
-                <a:solidFill>
-                  <a:schemeClr val="tx1">
-                    <a:lumMod val="60000"/>
-                    <a:lumOff val="40000"/>
-                  </a:schemeClr>
-                </a:solidFill>
-                <a:latin typeface="Courier New" pitchFamily="49" charset="0"/>
-                <a:cs typeface="Courier New" pitchFamily="49" charset="0"/>
-              </a:rPr>
-              <a:t>&lt;book&gt;</a:t>
-            </a:r>
-          </a:p>
-          <a:p>
-            <a:pPr marL="2574925" lvl="7">
-              <a:spcBef>
-                <a:spcPct val="0"/>
-              </a:spcBef>
-            </a:pPr>
-            <a:r>
-              <a:rPr lang="en-GB" sz="1600" b="1" dirty="0" smtClean="0">
-                <a:solidFill>
-                  <a:schemeClr val="tx1">
-                    <a:lumMod val="60000"/>
-                    <a:lumOff val="40000"/>
-                  </a:schemeClr>
-                </a:solidFill>
-                <a:latin typeface="Courier New" pitchFamily="49" charset="0"/>
-                <a:cs typeface="Courier New" pitchFamily="49" charset="0"/>
-              </a:rPr>
-              <a:t>  &lt;title&gt;Linked Data&lt;/title&gt;</a:t>
-            </a:r>
-          </a:p>
-          <a:p>
-            <a:pPr marL="2574925" lvl="7">
-              <a:spcBef>
-                <a:spcPct val="0"/>
-              </a:spcBef>
-            </a:pPr>
-            <a:r>
-              <a:rPr lang="en-GB" sz="1600" b="1" dirty="0" smtClean="0">
-                <a:solidFill>
-                  <a:schemeClr val="tx1">
-                    <a:lumMod val="60000"/>
-                    <a:lumOff val="40000"/>
-                  </a:schemeClr>
-                </a:solidFill>
-                <a:latin typeface="Courier New" pitchFamily="49" charset="0"/>
-                <a:cs typeface="Courier New" pitchFamily="49" charset="0"/>
-              </a:rPr>
-              <a:t>&lt;/book&gt;,</a:t>
-            </a:r>
-          </a:p>
-          <a:p>
-            <a:pPr marL="2574925" lvl="7">
-              <a:spcBef>
-                <a:spcPct val="0"/>
-              </a:spcBef>
-            </a:pPr>
-            <a:r>
-              <a:rPr lang="en-GB" sz="1600" b="1" dirty="0" smtClean="0">
-                <a:solidFill>
-                  <a:srgbClr val="C00000"/>
-                </a:solidFill>
-                <a:latin typeface="Courier New" pitchFamily="49" charset="0"/>
-                <a:cs typeface="Courier New" pitchFamily="49" charset="0"/>
-              </a:rPr>
-              <a:t>()</a:t>
-            </a:r>
-            <a:r>
-              <a:rPr lang="en-GB" sz="1600" b="1" dirty="0" smtClean="0">
-                <a:solidFill>
-                  <a:schemeClr val="tx1">
-                    <a:lumMod val="60000"/>
-                    <a:lumOff val="40000"/>
-                  </a:schemeClr>
-                </a:solidFill>
-                <a:latin typeface="Courier New" pitchFamily="49" charset="0"/>
-                <a:cs typeface="Courier New" pitchFamily="49" charset="0"/>
-              </a:rPr>
-              <a:t>, </a:t>
-            </a:r>
-            <a:r>
-              <a:rPr lang="en-GB" sz="1600" b="1" dirty="0" smtClean="0">
-                <a:solidFill>
-                  <a:srgbClr val="C00000"/>
-                </a:solidFill>
-                <a:latin typeface="Courier New" pitchFamily="49" charset="0"/>
-                <a:cs typeface="Courier New" pitchFamily="49" charset="0"/>
-              </a:rPr>
-              <a:t>()</a:t>
-            </a:r>
-            <a:r>
-              <a:rPr lang="en-GB" sz="1600" b="1" dirty="0" smtClean="0">
-                <a:solidFill>
-                  <a:schemeClr val="tx1">
-                    <a:lumMod val="60000"/>
-                    <a:lumOff val="40000"/>
-                  </a:schemeClr>
-                </a:solidFill>
-                <a:latin typeface="Courier New" pitchFamily="49" charset="0"/>
-                <a:cs typeface="Courier New" pitchFamily="49" charset="0"/>
-              </a:rPr>
-              <a:t>,</a:t>
-            </a:r>
-            <a:r>
-              <a:rPr lang="en-GB" sz="1600" b="1" dirty="0" smtClean="0">
-                <a:solidFill>
-                  <a:srgbClr val="C00000"/>
-                </a:solidFill>
-                <a:latin typeface="Courier New" pitchFamily="49" charset="0"/>
-                <a:cs typeface="Courier New" pitchFamily="49" charset="0"/>
-              </a:rPr>
-              <a:t> ()</a:t>
-            </a:r>
-            <a:r>
-              <a:rPr lang="en-GB" sz="1600" b="1" dirty="0" smtClean="0">
-                <a:solidFill>
-                  <a:schemeClr val="tx1">
-                    <a:lumMod val="60000"/>
-                    <a:lumOff val="40000"/>
-                  </a:schemeClr>
-                </a:solidFill>
-                <a:latin typeface="Courier New" pitchFamily="49" charset="0"/>
-                <a:cs typeface="Courier New" pitchFamily="49" charset="0"/>
-              </a:rPr>
-              <a:t>,</a:t>
-            </a:r>
-          </a:p>
-          <a:p>
-            <a:pPr marL="2574925" lvl="6">
-              <a:spcBef>
-                <a:spcPct val="0"/>
-              </a:spcBef>
-            </a:pPr>
-            <a:r>
-              <a:rPr lang="en-US" sz="1600" b="1" dirty="0" smtClean="0">
-                <a:solidFill>
-                  <a:schemeClr val="tx1">
-                    <a:lumMod val="60000"/>
-                    <a:lumOff val="40000"/>
-                  </a:schemeClr>
-                </a:solidFill>
-                <a:latin typeface="Courier New" pitchFamily="49" charset="0"/>
-                <a:cs typeface="Courier New" pitchFamily="49" charset="0"/>
-              </a:rPr>
-              <a:t>5780546120451828821</a:t>
-            </a:r>
-          </a:p>
-          <a:p>
-            <a:pPr marL="2117725" lvl="4">
-              <a:spcBef>
-                <a:spcPct val="0"/>
-              </a:spcBef>
-            </a:pPr>
-            <a:r>
-              <a:rPr lang="en-GB" sz="1600" b="1" dirty="0" smtClean="0">
-                <a:solidFill>
-                  <a:schemeClr val="tx1">
-                    <a:lumMod val="60000"/>
-                    <a:lumOff val="40000"/>
-                  </a:schemeClr>
-                </a:solidFill>
-                <a:latin typeface="Courier New" pitchFamily="49" charset="0"/>
-                <a:cs typeface="Courier New" pitchFamily="49" charset="0"/>
-              </a:rPr>
-              <a:t>)</a:t>
-            </a:r>
-            <a:endParaRPr kumimoji="0" lang="en-GB" sz="1600" b="1" i="0" u="none" strike="noStrike" kern="1200" cap="none" spc="0" normalizeH="0" baseline="0" noProof="0" dirty="0">
+              </a:rPr>
+              <a:t>RESTful</a:t>
+            </a:r>
+            <a:r>
+              <a:rPr lang="en-US" sz="3200" dirty="0" smtClean="0"/>
+              <a:t> interface for Graph Stores</a:t>
+            </a:r>
+            <a:endParaRPr kumimoji="0" lang="en-GB" sz="3200" i="0" u="none" strike="noStrike" kern="1200" cap="none" spc="0" normalizeH="0" baseline="0" noProof="0" dirty="0">
               <a:ln>
                 <a:noFill/>
               </a:ln>
               <a:solidFill>
                 <a:schemeClr val="tx1">
-                  <a:lumMod val="60000"/>
-                  <a:lumOff val="40000"/>
+                  <a:lumMod val="50000"/>
                 </a:schemeClr>
               </a:solidFill>
               <a:effectLst/>
               <a:uLnTx/>
               <a:uFillTx/>
-              <a:latin typeface="Courier New" pitchFamily="49" charset="0"/>
+              <a:latin typeface="Tahoma" pitchFamily="34" charset="0"/>
               <a:ea typeface="Tahoma" pitchFamily="34" charset="0"/>
-              <a:cs typeface="Courier New" pitchFamily="49" charset="0"/>
+              <a:cs typeface="Tahoma" pitchFamily="34" charset="0"/>
             </a:endParaRPr>
           </a:p>
         </p:txBody>
@@ -8400,102 +8232,6 @@
 </file>
 
 <file path=ppt/slides/slide23.xml><?xml version="1.0" encoding="utf-8"?>
-<p:sld xmlns:a="http://schemas.openxmlformats.org/drawingml/2006/main" xmlns:r="http://schemas.openxmlformats.org/officeDocument/2006/relationships" xmlns:p="http://schemas.openxmlformats.org/presentationml/2006/main">
-  <p:cSld>
-    <p:spTree>
-      <p:nvGrpSpPr>
-        <p:cNvPr id="1" name=""/>
-        <p:cNvGrpSpPr/>
-        <p:nvPr/>
-      </p:nvGrpSpPr>
-      <p:grpSpPr>
-        <a:xfrm>
-          <a:off x="0" y="0"/>
-          <a:ext cx="0" cy="0"/>
-          <a:chOff x="0" y="0"/>
-          <a:chExt cx="0" cy="0"/>
-        </a:xfrm>
-      </p:grpSpPr>
-      <p:sp>
-        <p:nvSpPr>
-          <p:cNvPr id="4" name="Title 1"/>
-          <p:cNvSpPr txBox="1">
-            <a:spLocks/>
-          </p:cNvSpPr>
-          <p:nvPr/>
-        </p:nvSpPr>
-        <p:spPr>
-          <a:xfrm>
-            <a:off x="697832" y="1772816"/>
-            <a:ext cx="7772400" cy="1514599"/>
-          </a:xfrm>
-          <a:prstGeom prst="rect">
-            <a:avLst/>
-          </a:prstGeom>
-        </p:spPr>
-        <p:txBody>
-          <a:bodyPr anchor="ctr"/>
-          <a:lstStyle/>
-          <a:p>
-            <a:pPr lvl="0" algn="ctr">
-              <a:spcBef>
-                <a:spcPct val="0"/>
-              </a:spcBef>
-            </a:pPr>
-            <a:r>
-              <a:rPr lang="en-US" sz="3200" dirty="0" smtClean="0"/>
-              <a:t>A </a:t>
-            </a:r>
-            <a:r>
-              <a:rPr lang="en-US" sz="3200" dirty="0" err="1" smtClean="0">
-                <a:solidFill>
-                  <a:srgbClr val="C00000"/>
-                </a:solidFill>
-              </a:rPr>
-              <a:t>RESTful</a:t>
-            </a:r>
-            <a:r>
-              <a:rPr lang="en-US" sz="3200" dirty="0" smtClean="0"/>
-              <a:t> interface for Graph Stores</a:t>
-            </a:r>
-            <a:endParaRPr kumimoji="0" lang="en-GB" sz="3200" i="0" u="none" strike="noStrike" kern="1200" cap="none" spc="0" normalizeH="0" baseline="0" noProof="0" dirty="0">
-              <a:ln>
-                <a:noFill/>
-              </a:ln>
-              <a:solidFill>
-                <a:schemeClr val="tx1">
-                  <a:lumMod val="50000"/>
-                </a:schemeClr>
-              </a:solidFill>
-              <a:effectLst/>
-              <a:uLnTx/>
-              <a:uFillTx/>
-              <a:latin typeface="Tahoma" pitchFamily="34" charset="0"/>
-              <a:ea typeface="Tahoma" pitchFamily="34" charset="0"/>
-              <a:cs typeface="Tahoma" pitchFamily="34" charset="0"/>
-            </a:endParaRPr>
-          </a:p>
-        </p:txBody>
-      </p:sp>
-    </p:spTree>
-  </p:cSld>
-  <p:clrMapOvr>
-    <a:masterClrMapping/>
-  </p:clrMapOvr>
-  <p:transition>
-    <p:fade/>
-  </p:transition>
-  <p:timing>
-    <p:tnLst>
-      <p:par>
-        <p:cTn id="1" dur="indefinite" restart="never" nodeType="tmRoot"/>
-      </p:par>
-    </p:tnLst>
-  </p:timing>
-</p:sld>
-</file>
-
-<file path=ppt/slides/slide24.xml><?xml version="1.0" encoding="utf-8"?>
 <p:sld xmlns:a="http://schemas.openxmlformats.org/drawingml/2006/main" xmlns:r="http://schemas.openxmlformats.org/officeDocument/2006/relationships" xmlns:p="http://schemas.openxmlformats.org/presentationml/2006/main">
   <p:cSld>
     <p:spTree>
@@ -9125,7 +8861,7 @@
 </p:sld>
 </file>
 
-<file path=ppt/slides/slide25.xml><?xml version="1.0" encoding="utf-8"?>
+<file path=ppt/slides/slide24.xml><?xml version="1.0" encoding="utf-8"?>
 <p:sld xmlns:a="http://schemas.openxmlformats.org/drawingml/2006/main" xmlns:r="http://schemas.openxmlformats.org/officeDocument/2006/relationships" xmlns:p="http://schemas.openxmlformats.org/presentationml/2006/main">
   <p:cSld>
     <p:spTree>
@@ -9230,7 +8966,7 @@
 </p:sld>
 </file>
 
-<file path=ppt/slides/slide26.xml><?xml version="1.0" encoding="utf-8"?>
+<file path=ppt/slides/slide25.xml><?xml version="1.0" encoding="utf-8"?>
 <p:sld xmlns:a="http://schemas.openxmlformats.org/drawingml/2006/main" xmlns:r="http://schemas.openxmlformats.org/officeDocument/2006/relationships" xmlns:p="http://schemas.openxmlformats.org/presentationml/2006/main">
   <p:cSld>
     <p:spTree>
@@ -9352,7 +9088,7 @@
 </p:sld>
 </file>
 
-<file path=ppt/slides/slide27.xml><?xml version="1.0" encoding="utf-8"?>
+<file path=ppt/slides/slide26.xml><?xml version="1.0" encoding="utf-8"?>
 <p:sld xmlns:a="http://schemas.openxmlformats.org/drawingml/2006/main" xmlns:r="http://schemas.openxmlformats.org/officeDocument/2006/relationships" xmlns:p="http://schemas.openxmlformats.org/presentationml/2006/main">
   <p:cSld>
     <p:spTree>
@@ -9825,6 +9561,9 @@
                     <p:cTn id="3" fill="hold">
                       <p:stCondLst>
                         <p:cond delay="indefinite"/>
+                        <p:cond evt="onBegin" delay="0">
+                          <p:tn val="2"/>
+                        </p:cond>
                       </p:stCondLst>
                       <p:childTnLst>
                         <p:par>
@@ -9834,7 +9573,7 @@
                             </p:stCondLst>
                             <p:childTnLst>
                               <p:par>
-                                <p:cTn id="5" presetID="2" presetClass="entr" presetSubtype="8" fill="hold" grpId="0" nodeType="clickEffect">
+                                <p:cTn id="5" presetID="2" presetClass="entr" presetSubtype="8" fill="hold" grpId="0" nodeType="afterEffect">
                                   <p:stCondLst>
                                     <p:cond delay="0"/>
                                   </p:stCondLst>
@@ -10060,7 +9799,7 @@
       </p:pic>
       <p:sp>
         <p:nvSpPr>
-          <p:cNvPr id="5" name="Title 1"/>
+          <p:cNvPr id="7" name="Title 1"/>
           <p:cNvSpPr txBox="1">
             <a:spLocks/>
           </p:cNvSpPr>
@@ -10068,15 +9807,15 @@
         </p:nvSpPr>
         <p:spPr>
           <a:xfrm>
-            <a:off x="693816" y="2088288"/>
-            <a:ext cx="7772400" cy="877331"/>
+            <a:off x="685800" y="1890383"/>
+            <a:ext cx="7772400" cy="1296954"/>
           </a:xfrm>
           <a:prstGeom prst="rect">
             <a:avLst/>
           </a:prstGeom>
           <a:solidFill>
             <a:schemeClr val="bg1">
-              <a:alpha val="90000"/>
+              <a:alpha val="80000"/>
             </a:schemeClr>
           </a:solidFill>
         </p:spPr>
@@ -10090,35 +9829,46 @@
               </a:spcBef>
             </a:pPr>
             <a:r>
-              <a:rPr lang="en-GB" sz="3200" dirty="0" smtClean="0">
+              <a:rPr lang="en-US" sz="3200" dirty="0" smtClean="0"/>
+              <a:t>Linked Data is built upon</a:t>
+            </a:r>
+          </a:p>
+          <a:p>
+            <a:pPr algn="ctr">
+              <a:spcBef>
+                <a:spcPct val="0"/>
+              </a:spcBef>
+            </a:pPr>
+            <a:r>
+              <a:rPr lang="en-US" sz="3200" dirty="0" smtClean="0">
                 <a:solidFill>
                   <a:srgbClr val="C00000"/>
                 </a:solidFill>
-              </a:rPr>
-              <a:t>Linked </a:t>
-            </a:r>
-            <a:r>
-              <a:rPr lang="en-GB" sz="3200" dirty="0" smtClean="0"/>
-              <a:t>Open</a:t>
-            </a:r>
-            <a:r>
-              <a:rPr lang="en-GB" sz="3200" dirty="0" smtClean="0">
-                <a:solidFill>
-                  <a:srgbClr val="C00000"/>
-                </a:solidFill>
-              </a:rPr>
-              <a:t> Data</a:t>
-            </a:r>
-            <a:endParaRPr kumimoji="0" lang="en-GB" sz="3200" i="0" u="none" strike="noStrike" kern="1200" cap="none" spc="0" normalizeH="0" baseline="0" noProof="0" dirty="0">
-              <a:ln>
-                <a:noFill/>
-              </a:ln>
+                <a:latin typeface="Tahoma" pitchFamily="34" charset="0"/>
+                <a:ea typeface="Tahoma" pitchFamily="34" charset="0"/>
+                <a:cs typeface="Tahoma" pitchFamily="34" charset="0"/>
+              </a:rPr>
+              <a:t>Semantic Web</a:t>
+            </a:r>
+            <a:r>
+              <a:rPr lang="en-US" sz="3200" dirty="0" smtClean="0">
+                <a:solidFill>
+                  <a:schemeClr val="tx1">
+                    <a:lumMod val="50000"/>
+                  </a:schemeClr>
+                </a:solidFill>
+                <a:latin typeface="Tahoma" pitchFamily="34" charset="0"/>
+                <a:ea typeface="Tahoma" pitchFamily="34" charset="0"/>
+                <a:cs typeface="Tahoma" pitchFamily="34" charset="0"/>
+              </a:rPr>
+              <a:t> Technologies</a:t>
+            </a:r>
+            <a:endParaRPr lang="en-GB" sz="3200" dirty="0" smtClean="0">
               <a:solidFill>
-                <a:srgbClr val="C00000"/>
+                <a:schemeClr val="tx1">
+                  <a:lumMod val="50000"/>
+                </a:schemeClr>
               </a:solidFill>
-              <a:effectLst/>
-              <a:uLnTx/>
-              <a:uFillTx/>
               <a:latin typeface="Tahoma" pitchFamily="34" charset="0"/>
               <a:ea typeface="Tahoma" pitchFamily="34" charset="0"/>
               <a:cs typeface="Tahoma" pitchFamily="34" charset="0"/>
@@ -10163,87 +9913,6 @@
       </p:grpSpPr>
       <p:sp>
         <p:nvSpPr>
-          <p:cNvPr id="3" name="Title 1"/>
-          <p:cNvSpPr txBox="1">
-            <a:spLocks/>
-          </p:cNvSpPr>
-          <p:nvPr/>
-        </p:nvSpPr>
-        <p:spPr>
-          <a:xfrm>
-            <a:off x="689916" y="2011715"/>
-            <a:ext cx="7772400" cy="1514599"/>
-          </a:xfrm>
-          <a:prstGeom prst="rect">
-            <a:avLst/>
-          </a:prstGeom>
-        </p:spPr>
-        <p:txBody>
-          <a:bodyPr anchor="ctr"/>
-          <a:lstStyle/>
-          <a:p>
-            <a:pPr lvl="0" algn="ctr">
-              <a:spcBef>
-                <a:spcPct val="0"/>
-              </a:spcBef>
-            </a:pPr>
-            <a:r>
-              <a:rPr kumimoji="0" lang="en-US" sz="3200" i="0" u="none" strike="noStrike" kern="1200" cap="none" spc="0" normalizeH="0" baseline="0" noProof="0" dirty="0" smtClean="0">
-                <a:ln>
-                  <a:noFill/>
-                </a:ln>
-                <a:solidFill>
-                  <a:srgbClr val="C00000"/>
-                </a:solidFill>
-                <a:effectLst/>
-                <a:uLnTx/>
-                <a:uFillTx/>
-                <a:latin typeface="Tahoma" pitchFamily="34" charset="0"/>
-                <a:ea typeface="Tahoma" pitchFamily="34" charset="0"/>
-                <a:cs typeface="Tahoma" pitchFamily="34" charset="0"/>
-              </a:rPr>
-              <a:t>Semantic Web</a:t>
-            </a:r>
-            <a:r>
-              <a:rPr kumimoji="0" lang="en-US" sz="3200" i="0" u="none" strike="noStrike" kern="1200" cap="none" spc="0" normalizeH="0" baseline="0" noProof="0" dirty="0" smtClean="0">
-                <a:ln>
-                  <a:noFill/>
-                </a:ln>
-                <a:solidFill>
-                  <a:schemeClr val="tx1">
-                    <a:lumMod val="50000"/>
-                  </a:schemeClr>
-                </a:solidFill>
-                <a:effectLst/>
-                <a:uLnTx/>
-                <a:uFillTx/>
-                <a:latin typeface="Tahoma" pitchFamily="34" charset="0"/>
-                <a:ea typeface="Tahoma" pitchFamily="34" charset="0"/>
-                <a:cs typeface="Tahoma" pitchFamily="34" charset="0"/>
-              </a:rPr>
-              <a:t> Technologies</a:t>
-            </a:r>
-            <a:endParaRPr kumimoji="0" lang="en-GB" sz="3200" i="0" u="none" strike="noStrike" kern="1200" cap="none" spc="0" normalizeH="0" baseline="0" noProof="0" dirty="0">
-              <a:ln>
-                <a:noFill/>
-              </a:ln>
-              <a:solidFill>
-                <a:schemeClr val="tx1">
-                  <a:lumMod val="50000"/>
-                </a:schemeClr>
-              </a:solidFill>
-              <a:effectLst/>
-              <a:uLnTx/>
-              <a:uFillTx/>
-              <a:latin typeface="Tahoma" pitchFamily="34" charset="0"/>
-              <a:ea typeface="Tahoma" pitchFamily="34" charset="0"/>
-              <a:cs typeface="Tahoma" pitchFamily="34" charset="0"/>
-            </a:endParaRPr>
-          </a:p>
-        </p:txBody>
-      </p:sp>
-      <p:sp>
-        <p:nvSpPr>
           <p:cNvPr id="4" name="Title 1"/>
           <p:cNvSpPr txBox="1">
             <a:spLocks/>
@@ -10269,17 +9938,39 @@
               </a:spcBef>
             </a:pPr>
             <a:r>
+              <a:rPr lang="en-US" sz="3200" dirty="0" smtClean="0">
+                <a:solidFill>
+                  <a:srgbClr val="C00000"/>
+                </a:solidFill>
+              </a:rPr>
+              <a:t>RDF</a:t>
+            </a:r>
+            <a:r>
               <a:rPr lang="en-US" sz="3200" dirty="0" smtClean="0"/>
-              <a:t>Linked Data is built upon</a:t>
-            </a:r>
-          </a:p>
-          <a:p>
-            <a:pPr lvl="0" algn="ctr">
-              <a:spcBef>
-                <a:spcPct val="0"/>
-              </a:spcBef>
-            </a:pPr>
-            <a:endParaRPr lang="en-US" sz="3200" dirty="0" smtClean="0"/>
+              <a:t> and </a:t>
+            </a:r>
+            <a:r>
+              <a:rPr lang="en-US" sz="3200" dirty="0" smtClean="0">
+                <a:solidFill>
+                  <a:srgbClr val="C00000"/>
+                </a:solidFill>
+              </a:rPr>
+              <a:t>SPARQL</a:t>
+            </a:r>
+            <a:endParaRPr kumimoji="0" lang="en-GB" sz="3200" i="0" u="none" strike="noStrike" kern="1200" cap="none" spc="0" normalizeH="0" baseline="0" noProof="0" dirty="0">
+              <a:ln>
+                <a:noFill/>
+              </a:ln>
+              <a:solidFill>
+                <a:srgbClr val="C00000"/>
+              </a:solidFill>
+              <a:effectLst/>
+              <a:uLnTx/>
+              <a:uFillTx/>
+              <a:latin typeface="Tahoma" pitchFamily="34" charset="0"/>
+              <a:ea typeface="Tahoma" pitchFamily="34" charset="0"/>
+              <a:cs typeface="Tahoma" pitchFamily="34" charset="0"/>
+            </a:endParaRPr>
           </a:p>
         </p:txBody>
       </p:sp>
@@ -10345,31 +10036,29 @@
               </a:spcBef>
             </a:pPr>
             <a:r>
-              <a:rPr lang="en-US" sz="3200" dirty="0" smtClean="0">
+              <a:rPr lang="en-GB" sz="3200" dirty="0" smtClean="0"/>
+              <a:t>A </a:t>
+            </a:r>
+            <a:r>
+              <a:rPr lang="en-GB" sz="3200" dirty="0" smtClean="0">
                 <a:solidFill>
                   <a:srgbClr val="C00000"/>
                 </a:solidFill>
               </a:rPr>
-              <a:t>RDF</a:t>
-            </a:r>
-            <a:r>
-              <a:rPr lang="en-US" sz="3200" dirty="0" smtClean="0"/>
-              <a:t> and </a:t>
-            </a:r>
-            <a:r>
-              <a:rPr lang="en-US" sz="3200" dirty="0" smtClean="0">
-                <a:solidFill>
-                  <a:srgbClr val="C00000"/>
-                </a:solidFill>
-              </a:rPr>
-              <a:t>SPARQL</a:t>
+              <a:t>lack</a:t>
+            </a:r>
+            <a:r>
+              <a:rPr lang="en-GB" sz="3200" dirty="0" smtClean="0"/>
+              <a:t> of standard protocols...</a:t>
             </a:r>
             <a:endParaRPr kumimoji="0" lang="en-GB" sz="3200" i="0" u="none" strike="noStrike" kern="1200" cap="none" spc="0" normalizeH="0" baseline="0" noProof="0" dirty="0">
               <a:ln>
                 <a:noFill/>
               </a:ln>
               <a:solidFill>
-                <a:srgbClr val="C00000"/>
+                <a:schemeClr val="tx1">
+                  <a:lumMod val="50000"/>
+                </a:schemeClr>
               </a:solidFill>
               <a:effectLst/>
               <a:uLnTx/>
@@ -10444,7 +10133,7 @@
             </a:pPr>
             <a:r>
               <a:rPr lang="en-GB" sz="3200" dirty="0" smtClean="0"/>
-              <a:t>A </a:t>
+              <a:t>...led to </a:t>
             </a:r>
             <a:r>
               <a:rPr lang="en-GB" sz="3200" dirty="0" smtClean="0">
@@ -10452,11 +10141,11 @@
                   <a:srgbClr val="C00000"/>
                 </a:solidFill>
               </a:rPr>
-              <a:t>lack</a:t>
+              <a:t>implementation specific</a:t>
             </a:r>
             <a:r>
               <a:rPr lang="en-GB" sz="3200" dirty="0" smtClean="0"/>
-              <a:t> of standard protocols...</a:t>
+              <a:t> APIs</a:t>
             </a:r>
             <a:endParaRPr kumimoji="0" lang="en-GB" sz="3200" i="0" u="none" strike="noStrike" kern="1200" cap="none" spc="0" normalizeH="0" baseline="0" noProof="0" dirty="0">
               <a:ln>

</xml_diff>